<commit_message>
add more content to source control presentation
</commit_message>
<xml_diff>
--- a/SourceControlPresentation.pptx
+++ b/SourceControlPresentation.pptx
@@ -5,7 +5,7 @@
     <p:sldMasterId id="2147483648" r:id="rId1"/>
   </p:sldMasterIdLst>
   <p:notesMasterIdLst>
-    <p:notesMasterId r:id="rId42"/>
+    <p:notesMasterId r:id="rId47"/>
   </p:notesMasterIdLst>
   <p:sldIdLst>
     <p:sldId id="283" r:id="rId2"/>
@@ -46,8 +46,13 @@
     <p:sldId id="281" r:id="rId37"/>
     <p:sldId id="278" r:id="rId38"/>
     <p:sldId id="282" r:id="rId39"/>
-    <p:sldId id="285" r:id="rId40"/>
-    <p:sldId id="260" r:id="rId41"/>
+    <p:sldId id="296" r:id="rId40"/>
+    <p:sldId id="297" r:id="rId41"/>
+    <p:sldId id="298" r:id="rId42"/>
+    <p:sldId id="299" r:id="rId43"/>
+    <p:sldId id="300" r:id="rId44"/>
+    <p:sldId id="285" r:id="rId45"/>
+    <p:sldId id="260" r:id="rId46"/>
   </p:sldIdLst>
   <p:sldSz cx="12192000" cy="6858000"/>
   <p:notesSz cx="6858000" cy="9144000"/>
@@ -146,7 +151,16 @@
       </a:defRPr>
     </a:lvl9pPr>
   </p:defaultTextStyle>
+  <p:extLst>
+    <p:ext uri="{EFAFB233-063F-42B5-8137-9DF3F51BA10A}">
+      <p15:sldGuideLst xmlns:p15="http://schemas.microsoft.com/office/powerpoint/2012/main"/>
+    </p:ext>
+  </p:extLst>
 </p:presentation>
+</file>
+
+<file path=ppt/revisionInfo.xml><?xml version="1.0" encoding="utf-8"?>
+<p1510:revInfo xmlns:a="http://schemas.openxmlformats.org/drawingml/2006/main" xmlns:r="http://schemas.openxmlformats.org/officeDocument/2006/relationships" xmlns:p1510="http://schemas.microsoft.com/office/powerpoint/2015/10/main"/>
 </file>
 
 <file path=ppt/notesMasters/notesMaster1.xml><?xml version="1.0" encoding="utf-8"?>
@@ -231,7 +245,7 @@
           <a:p>
             <a:fld id="{3733DD42-FD14-4855-98C3-181CA8A34E8E}" type="datetimeFigureOut">
               <a:rPr lang="en-GB" smtClean="0"/>
-              <a:t>10/09/2017</a:t>
+              <a:t>11/09/2017</a:t>
             </a:fld>
             <a:endParaRPr lang="en-GB"/>
           </a:p>
@@ -732,7 +746,7 @@
           <a:p>
             <a:fld id="{24945D3F-DF9E-4C59-88FA-96780F98C53A}" type="datetimeFigureOut">
               <a:rPr lang="en-GB" smtClean="0"/>
-              <a:t>10/09/2017</a:t>
+              <a:t>11/09/2017</a:t>
             </a:fld>
             <a:endParaRPr lang="en-GB"/>
           </a:p>
@@ -932,7 +946,7 @@
           <a:p>
             <a:fld id="{24945D3F-DF9E-4C59-88FA-96780F98C53A}" type="datetimeFigureOut">
               <a:rPr lang="en-GB" smtClean="0"/>
-              <a:t>10/09/2017</a:t>
+              <a:t>11/09/2017</a:t>
             </a:fld>
             <a:endParaRPr lang="en-GB"/>
           </a:p>
@@ -1142,7 +1156,7 @@
           <a:p>
             <a:fld id="{24945D3F-DF9E-4C59-88FA-96780F98C53A}" type="datetimeFigureOut">
               <a:rPr lang="en-GB" smtClean="0"/>
-              <a:t>10/09/2017</a:t>
+              <a:t>11/09/2017</a:t>
             </a:fld>
             <a:endParaRPr lang="en-GB"/>
           </a:p>
@@ -1342,7 +1356,7 @@
           <a:p>
             <a:fld id="{24945D3F-DF9E-4C59-88FA-96780F98C53A}" type="datetimeFigureOut">
               <a:rPr lang="en-GB" smtClean="0"/>
-              <a:t>10/09/2017</a:t>
+              <a:t>11/09/2017</a:t>
             </a:fld>
             <a:endParaRPr lang="en-GB"/>
           </a:p>
@@ -1618,7 +1632,7 @@
           <a:p>
             <a:fld id="{24945D3F-DF9E-4C59-88FA-96780F98C53A}" type="datetimeFigureOut">
               <a:rPr lang="en-GB" smtClean="0"/>
-              <a:t>10/09/2017</a:t>
+              <a:t>11/09/2017</a:t>
             </a:fld>
             <a:endParaRPr lang="en-GB"/>
           </a:p>
@@ -1886,7 +1900,7 @@
           <a:p>
             <a:fld id="{24945D3F-DF9E-4C59-88FA-96780F98C53A}" type="datetimeFigureOut">
               <a:rPr lang="en-GB" smtClean="0"/>
-              <a:t>10/09/2017</a:t>
+              <a:t>11/09/2017</a:t>
             </a:fld>
             <a:endParaRPr lang="en-GB"/>
           </a:p>
@@ -2301,7 +2315,7 @@
           <a:p>
             <a:fld id="{24945D3F-DF9E-4C59-88FA-96780F98C53A}" type="datetimeFigureOut">
               <a:rPr lang="en-GB" smtClean="0"/>
-              <a:t>10/09/2017</a:t>
+              <a:t>11/09/2017</a:t>
             </a:fld>
             <a:endParaRPr lang="en-GB"/>
           </a:p>
@@ -2443,7 +2457,7 @@
           <a:p>
             <a:fld id="{24945D3F-DF9E-4C59-88FA-96780F98C53A}" type="datetimeFigureOut">
               <a:rPr lang="en-GB" smtClean="0"/>
-              <a:t>10/09/2017</a:t>
+              <a:t>11/09/2017</a:t>
             </a:fld>
             <a:endParaRPr lang="en-GB"/>
           </a:p>
@@ -2556,7 +2570,7 @@
           <a:p>
             <a:fld id="{24945D3F-DF9E-4C59-88FA-96780F98C53A}" type="datetimeFigureOut">
               <a:rPr lang="en-GB" smtClean="0"/>
-              <a:t>10/09/2017</a:t>
+              <a:t>11/09/2017</a:t>
             </a:fld>
             <a:endParaRPr lang="en-GB"/>
           </a:p>
@@ -2869,7 +2883,7 @@
           <a:p>
             <a:fld id="{24945D3F-DF9E-4C59-88FA-96780F98C53A}" type="datetimeFigureOut">
               <a:rPr lang="en-GB" smtClean="0"/>
-              <a:t>10/09/2017</a:t>
+              <a:t>11/09/2017</a:t>
             </a:fld>
             <a:endParaRPr lang="en-GB"/>
           </a:p>
@@ -3158,7 +3172,7 @@
           <a:p>
             <a:fld id="{24945D3F-DF9E-4C59-88FA-96780F98C53A}" type="datetimeFigureOut">
               <a:rPr lang="en-GB" smtClean="0"/>
-              <a:t>10/09/2017</a:t>
+              <a:t>11/09/2017</a:t>
             </a:fld>
             <a:endParaRPr lang="en-GB"/>
           </a:p>
@@ -3401,7 +3415,7 @@
           <a:p>
             <a:fld id="{24945D3F-DF9E-4C59-88FA-96780F98C53A}" type="datetimeFigureOut">
               <a:rPr lang="en-GB" smtClean="0"/>
-              <a:t>10/09/2017</a:t>
+              <a:t>11/09/2017</a:t>
             </a:fld>
             <a:endParaRPr lang="en-GB"/>
           </a:p>
@@ -4164,7 +4178,9 @@
         </p:nvSpPr>
         <p:spPr/>
         <p:txBody>
-          <a:bodyPr/>
+          <a:bodyPr>
+            <a:normAutofit/>
+          </a:bodyPr>
           <a:lstStyle/>
           <a:p>
             <a:r>
@@ -4225,6 +4241,13 @@
             <a:r>
               <a:rPr lang="en-GB" dirty="0"/>
               <a:t>Still exists today (even at ASOS!)</a:t>
+            </a:r>
+          </a:p>
+          <a:p>
+            <a:pPr lvl="1"/>
+            <a:r>
+              <a:rPr lang="en-GB" dirty="0"/>
+              <a:t>TFS Online supports hosting git repos </a:t>
             </a:r>
           </a:p>
         </p:txBody>
@@ -7199,6 +7222,19 @@
             </a:r>
           </a:p>
           <a:p>
+            <a:r>
+              <a:rPr lang="en-GB" dirty="0"/>
+              <a:t>You might want to add the csc.exe to your path</a:t>
+            </a:r>
+          </a:p>
+          <a:p>
+            <a:r>
+              <a:rPr lang="en-US" dirty="0"/>
+              <a:t>Set PATH=%PATH%;c:\Windows\Microsoft.NET\Framework\v4.0.30319</a:t>
+            </a:r>
+            <a:endParaRPr lang="en-GB" dirty="0"/>
+          </a:p>
+          <a:p>
             <a:endParaRPr lang="en-GB" dirty="0"/>
           </a:p>
         </p:txBody>
@@ -7225,7 +7261,7 @@
         </p:blipFill>
         <p:spPr>
           <a:xfrm>
-            <a:off x="4104957" y="3144520"/>
+            <a:off x="3666418" y="4310847"/>
             <a:ext cx="3514725" cy="609600"/>
           </a:xfrm>
           <a:prstGeom prst="rect">
@@ -8259,7 +8295,7 @@
           <p:cNvPr id="2" name="Title 1">
             <a:extLst>
               <a:ext uri="{FF2B5EF4-FFF2-40B4-BE49-F238E27FC236}">
-                <a16:creationId xmlns:a16="http://schemas.microsoft.com/office/drawing/2014/main" id="{43D175A1-5AB2-4492-B163-396693DC66E1}"/>
+                <a16:creationId xmlns:a16="http://schemas.microsoft.com/office/drawing/2014/main" id="{CCE67E6E-134F-48D3-84D9-F5F190B54CA1}"/>
               </a:ext>
             </a:extLst>
           </p:cNvPr>
@@ -8277,7 +8313,7 @@
           <a:p>
             <a:r>
               <a:rPr lang="en-GB" dirty="0"/>
-              <a:t>References</a:t>
+              <a:t>So how do I share this so other people can help?</a:t>
             </a:r>
           </a:p>
         </p:txBody>
@@ -8287,7 +8323,7 @@
           <p:cNvPr id="3" name="Content Placeholder 2">
             <a:extLst>
               <a:ext uri="{FF2B5EF4-FFF2-40B4-BE49-F238E27FC236}">
-                <a16:creationId xmlns:a16="http://schemas.microsoft.com/office/drawing/2014/main" id="{7E4F96D4-87F3-4FBB-8828-BF2F4E48A40A}"/>
+                <a16:creationId xmlns:a16="http://schemas.microsoft.com/office/drawing/2014/main" id="{F1A3F3AA-F9B5-4D99-882C-4191589CB989}"/>
               </a:ext>
             </a:extLst>
           </p:cNvPr>
@@ -8304,57 +8340,41 @@
           <a:lstStyle/>
           <a:p>
             <a:r>
-              <a:rPr lang="en-GB" dirty="0">
-                <a:hlinkClick r:id="rId2"/>
-              </a:rPr>
-              <a:t>https://en.wikipedia.org/wiki/Version_control</a:t>
-            </a:r>
+              <a:rPr lang="en-GB" dirty="0"/>
+              <a:t>Lets create a central repo that we all sync with</a:t>
+            </a:r>
+          </a:p>
+          <a:p>
+            <a:r>
+              <a:rPr lang="en-GB" dirty="0"/>
+              <a:t>Lets use </a:t>
+            </a:r>
+            <a:r>
+              <a:rPr lang="en-GB" dirty="0" err="1"/>
+              <a:t>github</a:t>
+            </a:r>
+            <a:r>
+              <a:rPr lang="en-GB" dirty="0"/>
+              <a:t> for this! (at </a:t>
+            </a:r>
+            <a:r>
+              <a:rPr lang="en-GB" dirty="0" err="1"/>
+              <a:t>asos</a:t>
+            </a:r>
+            <a:r>
+              <a:rPr lang="en-GB" dirty="0"/>
+              <a:t> we would use TFS)</a:t>
+            </a:r>
+          </a:p>
+          <a:p>
             <a:endParaRPr lang="en-GB" dirty="0"/>
-          </a:p>
-          <a:p>
-            <a:r>
-              <a:rPr lang="en-GB" dirty="0">
-                <a:hlinkClick r:id="rId3"/>
-              </a:rPr>
-              <a:t>https://en.wikipedia.org/wiki/Source_Code_Control_System</a:t>
-            </a:r>
-          </a:p>
-          <a:p>
-            <a:r>
-              <a:rPr lang="en-GB" dirty="0">
-                <a:hlinkClick r:id="rId3"/>
-              </a:rPr>
-              <a:t>https://en.wikipedia.org/wiki/Interleaved_deltas</a:t>
-            </a:r>
-            <a:endParaRPr lang="en-GB" dirty="0"/>
-          </a:p>
-          <a:p>
-            <a:r>
-              <a:rPr lang="en-GB" dirty="0"/>
-              <a:t>http://docs.oracle.com/cd/E19504-01/802-5880/6i9k05dhp/index.html</a:t>
-            </a:r>
-          </a:p>
-          <a:p>
-            <a:r>
-              <a:rPr lang="en-GB" dirty="0">
-                <a:hlinkClick r:id="rId4"/>
-              </a:rPr>
-              <a:t>https://en.wikipedia.org/wiki/Concurrent_Versions_System</a:t>
-            </a:r>
-            <a:endParaRPr lang="en-GB" dirty="0"/>
-          </a:p>
-          <a:p>
-            <a:r>
-              <a:rPr lang="en-GB" dirty="0"/>
-              <a:t>https://simpleprogrammer.com/2017/01/16/software-developers-know-source-control/</a:t>
-            </a:r>
           </a:p>
         </p:txBody>
       </p:sp>
     </p:spTree>
     <p:extLst>
       <p:ext uri="{BB962C8B-B14F-4D97-AF65-F5344CB8AC3E}">
-        <p14:creationId xmlns:p14="http://schemas.microsoft.com/office/powerpoint/2010/main" val="3368069882"/>
+        <p14:creationId xmlns:p14="http://schemas.microsoft.com/office/powerpoint/2010/main" val="3312405786"/>
       </p:ext>
     </p:extLst>
   </p:cSld>
@@ -8519,11 +8539,516 @@
           <a:chExt cx="0" cy="0"/>
         </a:xfrm>
       </p:grpSpPr>
+      <p:pic>
+        <p:nvPicPr>
+          <p:cNvPr id="6" name="Picture 5">
+            <a:extLst>
+              <a:ext uri="{FF2B5EF4-FFF2-40B4-BE49-F238E27FC236}">
+                <a16:creationId xmlns:a16="http://schemas.microsoft.com/office/drawing/2014/main" id="{A70BAA12-857F-443B-BF56-CAFBB7D94EF4}"/>
+              </a:ext>
+            </a:extLst>
+          </p:cNvPr>
+          <p:cNvPicPr>
+            <a:picLocks noChangeAspect="1"/>
+          </p:cNvPicPr>
+          <p:nvPr/>
+        </p:nvPicPr>
+        <p:blipFill>
+          <a:blip r:embed="rId2"/>
+          <a:stretch>
+            <a:fillRect/>
+          </a:stretch>
+        </p:blipFill>
+        <p:spPr>
+          <a:xfrm>
+            <a:off x="709126" y="828441"/>
+            <a:ext cx="10997253" cy="4741935"/>
+          </a:xfrm>
+          <a:prstGeom prst="rect">
+            <a:avLst/>
+          </a:prstGeom>
+        </p:spPr>
+      </p:pic>
+    </p:spTree>
+    <p:extLst>
+      <p:ext uri="{BB962C8B-B14F-4D97-AF65-F5344CB8AC3E}">
+        <p14:creationId xmlns:p14="http://schemas.microsoft.com/office/powerpoint/2010/main" val="2670378417"/>
+      </p:ext>
+    </p:extLst>
+  </p:cSld>
+  <p:clrMapOvr>
+    <a:masterClrMapping/>
+  </p:clrMapOvr>
+</p:sld>
+</file>
+
+<file path=ppt/slides/slide41.xml><?xml version="1.0" encoding="utf-8"?>
+<p:sld xmlns:a="http://schemas.openxmlformats.org/drawingml/2006/main" xmlns:r="http://schemas.openxmlformats.org/officeDocument/2006/relationships" xmlns:p="http://schemas.openxmlformats.org/presentationml/2006/main">
+  <p:cSld>
+    <p:spTree>
+      <p:nvGrpSpPr>
+        <p:cNvPr id="1" name=""/>
+        <p:cNvGrpSpPr/>
+        <p:nvPr/>
+      </p:nvGrpSpPr>
+      <p:grpSpPr>
+        <a:xfrm>
+          <a:off x="0" y="0"/>
+          <a:ext cx="0" cy="0"/>
+          <a:chOff x="0" y="0"/>
+          <a:chExt cx="0" cy="0"/>
+        </a:xfrm>
+      </p:grpSpPr>
+      <p:pic>
+        <p:nvPicPr>
+          <p:cNvPr id="5" name="Picture 4">
+            <a:extLst>
+              <a:ext uri="{FF2B5EF4-FFF2-40B4-BE49-F238E27FC236}">
+                <a16:creationId xmlns:a16="http://schemas.microsoft.com/office/drawing/2014/main" id="{8FA21748-35CD-42CF-A4A2-37926A43E504}"/>
+              </a:ext>
+            </a:extLst>
+          </p:cNvPr>
+          <p:cNvPicPr>
+            <a:picLocks noChangeAspect="1"/>
+          </p:cNvPicPr>
+          <p:nvPr/>
+        </p:nvPicPr>
+        <p:blipFill>
+          <a:blip r:embed="rId2"/>
+          <a:stretch>
+            <a:fillRect/>
+          </a:stretch>
+        </p:blipFill>
+        <p:spPr>
+          <a:xfrm>
+            <a:off x="943061" y="475860"/>
+            <a:ext cx="6533591" cy="6204857"/>
+          </a:xfrm>
+          <a:prstGeom prst="rect">
+            <a:avLst/>
+          </a:prstGeom>
+        </p:spPr>
+      </p:pic>
+    </p:spTree>
+    <p:extLst>
+      <p:ext uri="{BB962C8B-B14F-4D97-AF65-F5344CB8AC3E}">
+        <p14:creationId xmlns:p14="http://schemas.microsoft.com/office/powerpoint/2010/main" val="694714814"/>
+      </p:ext>
+    </p:extLst>
+  </p:cSld>
+  <p:clrMapOvr>
+    <a:masterClrMapping/>
+  </p:clrMapOvr>
+</p:sld>
+</file>
+
+<file path=ppt/slides/slide42.xml><?xml version="1.0" encoding="utf-8"?>
+<p:sld xmlns:a="http://schemas.openxmlformats.org/drawingml/2006/main" xmlns:r="http://schemas.openxmlformats.org/officeDocument/2006/relationships" xmlns:p="http://schemas.openxmlformats.org/presentationml/2006/main">
+  <p:cSld>
+    <p:spTree>
+      <p:nvGrpSpPr>
+        <p:cNvPr id="1" name=""/>
+        <p:cNvGrpSpPr/>
+        <p:nvPr/>
+      </p:nvGrpSpPr>
+      <p:grpSpPr>
+        <a:xfrm>
+          <a:off x="0" y="0"/>
+          <a:ext cx="0" cy="0"/>
+          <a:chOff x="0" y="0"/>
+          <a:chExt cx="0" cy="0"/>
+        </a:xfrm>
+      </p:grpSpPr>
       <p:sp>
         <p:nvSpPr>
           <p:cNvPr id="2" name="Title 1">
             <a:extLst>
               <a:ext uri="{FF2B5EF4-FFF2-40B4-BE49-F238E27FC236}">
+                <a16:creationId xmlns:a16="http://schemas.microsoft.com/office/drawing/2014/main" id="{EA75B783-8944-42B3-BE9F-EB970D55ACCE}"/>
+              </a:ext>
+            </a:extLst>
+          </p:cNvPr>
+          <p:cNvSpPr>
+            <a:spLocks noGrp="1"/>
+          </p:cNvSpPr>
+          <p:nvPr>
+            <p:ph type="title"/>
+          </p:nvPr>
+        </p:nvSpPr>
+        <p:spPr/>
+        <p:txBody>
+          <a:bodyPr/>
+          <a:lstStyle/>
+          <a:p>
+            <a:r>
+              <a:rPr lang="en-GB" dirty="0"/>
+              <a:t>Add a remote!</a:t>
+            </a:r>
+          </a:p>
+        </p:txBody>
+      </p:sp>
+      <p:pic>
+        <p:nvPicPr>
+          <p:cNvPr id="4" name="Picture 3">
+            <a:extLst>
+              <a:ext uri="{FF2B5EF4-FFF2-40B4-BE49-F238E27FC236}">
+                <a16:creationId xmlns:a16="http://schemas.microsoft.com/office/drawing/2014/main" id="{906011F4-649F-4505-8DB4-73F9306DC30C}"/>
+              </a:ext>
+            </a:extLst>
+          </p:cNvPr>
+          <p:cNvPicPr>
+            <a:picLocks noChangeAspect="1"/>
+          </p:cNvPicPr>
+          <p:nvPr/>
+        </p:nvPicPr>
+        <p:blipFill>
+          <a:blip r:embed="rId2"/>
+          <a:stretch>
+            <a:fillRect/>
+          </a:stretch>
+        </p:blipFill>
+        <p:spPr>
+          <a:xfrm>
+            <a:off x="1507089" y="1690688"/>
+            <a:ext cx="7143750" cy="1409700"/>
+          </a:xfrm>
+          <a:prstGeom prst="rect">
+            <a:avLst/>
+          </a:prstGeom>
+        </p:spPr>
+      </p:pic>
+      <p:sp>
+        <p:nvSpPr>
+          <p:cNvPr id="5" name="Content Placeholder 2">
+            <a:extLst>
+              <a:ext uri="{FF2B5EF4-FFF2-40B4-BE49-F238E27FC236}">
+                <a16:creationId xmlns:a16="http://schemas.microsoft.com/office/drawing/2014/main" id="{87D79CF4-CB8C-4AFD-AA69-0569DC628FFB}"/>
+              </a:ext>
+            </a:extLst>
+          </p:cNvPr>
+          <p:cNvSpPr>
+            <a:spLocks noGrp="1"/>
+          </p:cNvSpPr>
+          <p:nvPr>
+            <p:ph idx="1"/>
+          </p:nvPr>
+        </p:nvSpPr>
+        <p:spPr>
+          <a:xfrm>
+            <a:off x="838200" y="3452327"/>
+            <a:ext cx="10515600" cy="2724636"/>
+          </a:xfrm>
+        </p:spPr>
+        <p:txBody>
+          <a:bodyPr/>
+          <a:lstStyle/>
+          <a:p>
+            <a:r>
+              <a:rPr lang="en-GB" dirty="0"/>
+              <a:t>Create a remote, called origin, that points to </a:t>
+            </a:r>
+            <a:r>
+              <a:rPr lang="en-GB" dirty="0" err="1"/>
+              <a:t>git@github.com:milodotnet</a:t>
+            </a:r>
+            <a:r>
+              <a:rPr lang="en-GB" dirty="0"/>
+              <a:t>/</a:t>
+            </a:r>
+            <a:r>
+              <a:rPr lang="en-GB" dirty="0" err="1"/>
+              <a:t>calculator.git</a:t>
+            </a:r>
+            <a:endParaRPr lang="en-GB" dirty="0"/>
+          </a:p>
+          <a:p>
+            <a:r>
+              <a:rPr lang="en-GB" dirty="0"/>
+              <a:t>Push the commits from my local repo to the remote, and set it as the upstream (-u) – this sets this as the remote upstream for </a:t>
+            </a:r>
+            <a:r>
+              <a:rPr lang="en-GB" dirty="0" err="1"/>
+              <a:t>argumentless</a:t>
+            </a:r>
+            <a:r>
+              <a:rPr lang="en-GB" dirty="0"/>
+              <a:t> commands (e.g. git pull), origin gives the name of the remote, and master the name of the branch</a:t>
+            </a:r>
+          </a:p>
+          <a:p>
+            <a:pPr marL="0" indent="0">
+              <a:buNone/>
+            </a:pPr>
+            <a:endParaRPr lang="en-GB" dirty="0"/>
+          </a:p>
+          <a:p>
+            <a:pPr marL="0" indent="0">
+              <a:buNone/>
+            </a:pPr>
+            <a:endParaRPr lang="en-GB" dirty="0"/>
+          </a:p>
+        </p:txBody>
+      </p:sp>
+    </p:spTree>
+    <p:extLst>
+      <p:ext uri="{BB962C8B-B14F-4D97-AF65-F5344CB8AC3E}">
+        <p14:creationId xmlns:p14="http://schemas.microsoft.com/office/powerpoint/2010/main" val="2752080940"/>
+      </p:ext>
+    </p:extLst>
+  </p:cSld>
+  <p:clrMapOvr>
+    <a:masterClrMapping/>
+  </p:clrMapOvr>
+</p:sld>
+</file>
+
+<file path=ppt/slides/slide43.xml><?xml version="1.0" encoding="utf-8"?>
+<p:sld xmlns:a="http://schemas.openxmlformats.org/drawingml/2006/main" xmlns:r="http://schemas.openxmlformats.org/officeDocument/2006/relationships" xmlns:p="http://schemas.openxmlformats.org/presentationml/2006/main">
+  <p:cSld>
+    <p:spTree>
+      <p:nvGrpSpPr>
+        <p:cNvPr id="1" name=""/>
+        <p:cNvGrpSpPr/>
+        <p:nvPr/>
+      </p:nvGrpSpPr>
+      <p:grpSpPr>
+        <a:xfrm>
+          <a:off x="0" y="0"/>
+          <a:ext cx="0" cy="0"/>
+          <a:chOff x="0" y="0"/>
+          <a:chExt cx="0" cy="0"/>
+        </a:xfrm>
+      </p:grpSpPr>
+      <p:sp>
+        <p:nvSpPr>
+          <p:cNvPr id="2" name="Title 1">
+            <a:extLst>
+              <a:ext uri="{FF2B5EF4-FFF2-40B4-BE49-F238E27FC236}">
+                <a16:creationId xmlns:a16="http://schemas.microsoft.com/office/drawing/2014/main" id="{1BE528FC-BCD6-473F-89BC-2857642C8189}"/>
+              </a:ext>
+            </a:extLst>
+          </p:cNvPr>
+          <p:cNvSpPr>
+            <a:spLocks noGrp="1"/>
+          </p:cNvSpPr>
+          <p:nvPr>
+            <p:ph type="title"/>
+          </p:nvPr>
+        </p:nvSpPr>
+        <p:spPr/>
+        <p:txBody>
+          <a:bodyPr/>
+          <a:lstStyle/>
+          <a:p>
+            <a:r>
+              <a:rPr lang="en-GB" dirty="0"/>
+              <a:t>Lets start collaborating</a:t>
+            </a:r>
+          </a:p>
+        </p:txBody>
+      </p:sp>
+      <p:sp>
+        <p:nvSpPr>
+          <p:cNvPr id="3" name="Content Placeholder 2">
+            <a:extLst>
+              <a:ext uri="{FF2B5EF4-FFF2-40B4-BE49-F238E27FC236}">
+                <a16:creationId xmlns:a16="http://schemas.microsoft.com/office/drawing/2014/main" id="{95CEFC14-3BF4-457E-BB1A-361A79F082B8}"/>
+              </a:ext>
+            </a:extLst>
+          </p:cNvPr>
+          <p:cNvSpPr>
+            <a:spLocks noGrp="1"/>
+          </p:cNvSpPr>
+          <p:nvPr>
+            <p:ph idx="1"/>
+          </p:nvPr>
+        </p:nvSpPr>
+        <p:spPr/>
+        <p:txBody>
+          <a:bodyPr/>
+          <a:lstStyle/>
+          <a:p>
+            <a:r>
+              <a:rPr lang="en-GB" dirty="0"/>
+              <a:t>Split into groups of two</a:t>
+            </a:r>
+          </a:p>
+          <a:p>
+            <a:r>
+              <a:rPr lang="en-GB" dirty="0"/>
+              <a:t>Your task is to add two operations to the calculator program, add and subtract</a:t>
+            </a:r>
+          </a:p>
+          <a:p>
+            <a:r>
+              <a:rPr lang="en-GB" dirty="0"/>
+              <a:t>You each want to build one of these operations</a:t>
+            </a:r>
+          </a:p>
+        </p:txBody>
+      </p:sp>
+    </p:spTree>
+    <p:extLst>
+      <p:ext uri="{BB962C8B-B14F-4D97-AF65-F5344CB8AC3E}">
+        <p14:creationId xmlns:p14="http://schemas.microsoft.com/office/powerpoint/2010/main" val="4175373562"/>
+      </p:ext>
+    </p:extLst>
+  </p:cSld>
+  <p:clrMapOvr>
+    <a:masterClrMapping/>
+  </p:clrMapOvr>
+</p:sld>
+</file>
+
+<file path=ppt/slides/slide44.xml><?xml version="1.0" encoding="utf-8"?>
+<p:sld xmlns:a="http://schemas.openxmlformats.org/drawingml/2006/main" xmlns:r="http://schemas.openxmlformats.org/officeDocument/2006/relationships" xmlns:p="http://schemas.openxmlformats.org/presentationml/2006/main">
+  <p:cSld>
+    <p:spTree>
+      <p:nvGrpSpPr>
+        <p:cNvPr id="1" name=""/>
+        <p:cNvGrpSpPr/>
+        <p:nvPr/>
+      </p:nvGrpSpPr>
+      <p:grpSpPr>
+        <a:xfrm>
+          <a:off x="0" y="0"/>
+          <a:ext cx="0" cy="0"/>
+          <a:chOff x="0" y="0"/>
+          <a:chExt cx="0" cy="0"/>
+        </a:xfrm>
+      </p:grpSpPr>
+      <p:sp>
+        <p:nvSpPr>
+          <p:cNvPr id="2" name="Title 1">
+            <a:extLst>
+              <a:ext uri="{FF2B5EF4-FFF2-40B4-BE49-F238E27FC236}">
+                <a16:creationId xmlns:a16="http://schemas.microsoft.com/office/drawing/2014/main" id="{43D175A1-5AB2-4492-B163-396693DC66E1}"/>
+              </a:ext>
+            </a:extLst>
+          </p:cNvPr>
+          <p:cNvSpPr>
+            <a:spLocks noGrp="1"/>
+          </p:cNvSpPr>
+          <p:nvPr>
+            <p:ph type="title"/>
+          </p:nvPr>
+        </p:nvSpPr>
+        <p:spPr/>
+        <p:txBody>
+          <a:bodyPr/>
+          <a:lstStyle/>
+          <a:p>
+            <a:r>
+              <a:rPr lang="en-GB" dirty="0"/>
+              <a:t>References</a:t>
+            </a:r>
+          </a:p>
+        </p:txBody>
+      </p:sp>
+      <p:sp>
+        <p:nvSpPr>
+          <p:cNvPr id="3" name="Content Placeholder 2">
+            <a:extLst>
+              <a:ext uri="{FF2B5EF4-FFF2-40B4-BE49-F238E27FC236}">
+                <a16:creationId xmlns:a16="http://schemas.microsoft.com/office/drawing/2014/main" id="{7E4F96D4-87F3-4FBB-8828-BF2F4E48A40A}"/>
+              </a:ext>
+            </a:extLst>
+          </p:cNvPr>
+          <p:cNvSpPr>
+            <a:spLocks noGrp="1"/>
+          </p:cNvSpPr>
+          <p:nvPr>
+            <p:ph idx="1"/>
+          </p:nvPr>
+        </p:nvSpPr>
+        <p:spPr/>
+        <p:txBody>
+          <a:bodyPr/>
+          <a:lstStyle/>
+          <a:p>
+            <a:r>
+              <a:rPr lang="en-GB" dirty="0">
+                <a:hlinkClick r:id="rId2"/>
+              </a:rPr>
+              <a:t>https://en.wikipedia.org/wiki/Version_control</a:t>
+            </a:r>
+            <a:endParaRPr lang="en-GB" dirty="0"/>
+          </a:p>
+          <a:p>
+            <a:r>
+              <a:rPr lang="en-GB" dirty="0">
+                <a:hlinkClick r:id="rId3"/>
+              </a:rPr>
+              <a:t>https://en.wikipedia.org/wiki/Source_Code_Control_System</a:t>
+            </a:r>
+          </a:p>
+          <a:p>
+            <a:r>
+              <a:rPr lang="en-GB" dirty="0">
+                <a:hlinkClick r:id="rId3"/>
+              </a:rPr>
+              <a:t>https://en.wikipedia.org/wiki/Interleaved_deltas</a:t>
+            </a:r>
+            <a:endParaRPr lang="en-GB" dirty="0"/>
+          </a:p>
+          <a:p>
+            <a:r>
+              <a:rPr lang="en-GB" dirty="0"/>
+              <a:t>http://docs.oracle.com/cd/E19504-01/802-5880/6i9k05dhp/index.html</a:t>
+            </a:r>
+          </a:p>
+          <a:p>
+            <a:r>
+              <a:rPr lang="en-GB" dirty="0">
+                <a:hlinkClick r:id="rId4"/>
+              </a:rPr>
+              <a:t>https://en.wikipedia.org/wiki/Concurrent_Versions_System</a:t>
+            </a:r>
+            <a:endParaRPr lang="en-GB" dirty="0"/>
+          </a:p>
+          <a:p>
+            <a:r>
+              <a:rPr lang="en-GB" dirty="0"/>
+              <a:t>https://simpleprogrammer.com/2017/01/16/software-developers-know-source-control/</a:t>
+            </a:r>
+          </a:p>
+        </p:txBody>
+      </p:sp>
+    </p:spTree>
+    <p:extLst>
+      <p:ext uri="{BB962C8B-B14F-4D97-AF65-F5344CB8AC3E}">
+        <p14:creationId xmlns:p14="http://schemas.microsoft.com/office/powerpoint/2010/main" val="3368069882"/>
+      </p:ext>
+    </p:extLst>
+  </p:cSld>
+  <p:clrMapOvr>
+    <a:masterClrMapping/>
+  </p:clrMapOvr>
+</p:sld>
+</file>
+
+<file path=ppt/slides/slide45.xml><?xml version="1.0" encoding="utf-8"?>
+<p:sld xmlns:a="http://schemas.openxmlformats.org/drawingml/2006/main" xmlns:r="http://schemas.openxmlformats.org/officeDocument/2006/relationships" xmlns:p="http://schemas.openxmlformats.org/presentationml/2006/main">
+  <p:cSld>
+    <p:spTree>
+      <p:nvGrpSpPr>
+        <p:cNvPr id="1" name=""/>
+        <p:cNvGrpSpPr/>
+        <p:nvPr/>
+      </p:nvGrpSpPr>
+      <p:grpSpPr>
+        <a:xfrm>
+          <a:off x="0" y="0"/>
+          <a:ext cx="0" cy="0"/>
+          <a:chOff x="0" y="0"/>
+          <a:chExt cx="0" cy="0"/>
+        </a:xfrm>
+      </p:grpSpPr>
+      <p:sp>
+        <p:nvSpPr>
+          <p:cNvPr id="2" name="Title 1">
+            <a:extLst>
+              <a:ext uri="{FF2B5EF4-FFF2-40B4-BE49-F238E27FC236}">
                 <a16:creationId xmlns:a16="http://schemas.microsoft.com/office/drawing/2014/main" id="{400FFD8F-945C-435A-A75E-F7E7E3B181B0}"/>
               </a:ext>
             </a:extLst>
@@ -8566,7 +9091,7 @@
         <p:spPr/>
         <p:txBody>
           <a:bodyPr>
-            <a:normAutofit fontScale="92500" lnSpcReduction="10000"/>
+            <a:normAutofit fontScale="92500" lnSpcReduction="20000"/>
           </a:bodyPr>
           <a:lstStyle/>
           <a:p>
@@ -8640,8 +9165,17 @@
           </a:p>
           <a:p>
             <a:r>
-              <a:rPr lang="en-GB" dirty="0"/>
+              <a:rPr lang="en-GB" dirty="0">
+                <a:hlinkClick r:id="rId9"/>
+              </a:rPr>
               <a:t>https://git-scm.com/book/en/v2/Git-Internals-Git-References</a:t>
+            </a:r>
+            <a:endParaRPr lang="en-GB" dirty="0"/>
+          </a:p>
+          <a:p>
+            <a:r>
+              <a:rPr lang="en-GB" dirty="0"/>
+              <a:t>https://git-scm.com/docs/git-push</a:t>
             </a:r>
           </a:p>
           <a:p>

</xml_diff>

<commit_message>
refactor some of the content in the history section
</commit_message>
<xml_diff>
--- a/SourceControlPresentation.pptx
+++ b/SourceControlPresentation.pptx
@@ -5,54 +5,58 @@
     <p:sldMasterId id="2147483648" r:id="rId1"/>
   </p:sldMasterIdLst>
   <p:notesMasterIdLst>
-    <p:notesMasterId r:id="rId47"/>
+    <p:notesMasterId r:id="rId51"/>
   </p:notesMasterIdLst>
   <p:sldIdLst>
     <p:sldId id="283" r:id="rId2"/>
     <p:sldId id="284" r:id="rId3"/>
     <p:sldId id="286" r:id="rId4"/>
     <p:sldId id="287" r:id="rId5"/>
-    <p:sldId id="288" r:id="rId6"/>
-    <p:sldId id="289" r:id="rId7"/>
-    <p:sldId id="294" r:id="rId8"/>
-    <p:sldId id="295" r:id="rId9"/>
-    <p:sldId id="291" r:id="rId10"/>
-    <p:sldId id="293" r:id="rId11"/>
-    <p:sldId id="292" r:id="rId12"/>
-    <p:sldId id="290" r:id="rId13"/>
-    <p:sldId id="256" r:id="rId14"/>
-    <p:sldId id="257" r:id="rId15"/>
-    <p:sldId id="258" r:id="rId16"/>
-    <p:sldId id="259" r:id="rId17"/>
-    <p:sldId id="261" r:id="rId18"/>
-    <p:sldId id="262" r:id="rId19"/>
-    <p:sldId id="263" r:id="rId20"/>
-    <p:sldId id="264" r:id="rId21"/>
-    <p:sldId id="265" r:id="rId22"/>
-    <p:sldId id="266" r:id="rId23"/>
-    <p:sldId id="267" r:id="rId24"/>
-    <p:sldId id="268" r:id="rId25"/>
-    <p:sldId id="271" r:id="rId26"/>
-    <p:sldId id="272" r:id="rId27"/>
-    <p:sldId id="270" r:id="rId28"/>
-    <p:sldId id="269" r:id="rId29"/>
-    <p:sldId id="273" r:id="rId30"/>
-    <p:sldId id="274" r:id="rId31"/>
-    <p:sldId id="275" r:id="rId32"/>
-    <p:sldId id="276" r:id="rId33"/>
-    <p:sldId id="277" r:id="rId34"/>
-    <p:sldId id="279" r:id="rId35"/>
-    <p:sldId id="280" r:id="rId36"/>
-    <p:sldId id="281" r:id="rId37"/>
-    <p:sldId id="278" r:id="rId38"/>
-    <p:sldId id="282" r:id="rId39"/>
-    <p:sldId id="296" r:id="rId40"/>
-    <p:sldId id="297" r:id="rId41"/>
-    <p:sldId id="298" r:id="rId42"/>
-    <p:sldId id="299" r:id="rId43"/>
-    <p:sldId id="300" r:id="rId44"/>
-    <p:sldId id="285" r:id="rId45"/>
-    <p:sldId id="260" r:id="rId46"/>
+    <p:sldId id="301" r:id="rId6"/>
+    <p:sldId id="288" r:id="rId7"/>
+    <p:sldId id="303" r:id="rId8"/>
+    <p:sldId id="302" r:id="rId9"/>
+    <p:sldId id="289" r:id="rId10"/>
+    <p:sldId id="304" r:id="rId11"/>
+    <p:sldId id="294" r:id="rId12"/>
+    <p:sldId id="295" r:id="rId13"/>
+    <p:sldId id="291" r:id="rId14"/>
+    <p:sldId id="293" r:id="rId15"/>
+    <p:sldId id="292" r:id="rId16"/>
+    <p:sldId id="290" r:id="rId17"/>
+    <p:sldId id="256" r:id="rId18"/>
+    <p:sldId id="257" r:id="rId19"/>
+    <p:sldId id="258" r:id="rId20"/>
+    <p:sldId id="259" r:id="rId21"/>
+    <p:sldId id="261" r:id="rId22"/>
+    <p:sldId id="262" r:id="rId23"/>
+    <p:sldId id="263" r:id="rId24"/>
+    <p:sldId id="264" r:id="rId25"/>
+    <p:sldId id="265" r:id="rId26"/>
+    <p:sldId id="266" r:id="rId27"/>
+    <p:sldId id="267" r:id="rId28"/>
+    <p:sldId id="268" r:id="rId29"/>
+    <p:sldId id="271" r:id="rId30"/>
+    <p:sldId id="272" r:id="rId31"/>
+    <p:sldId id="270" r:id="rId32"/>
+    <p:sldId id="269" r:id="rId33"/>
+    <p:sldId id="273" r:id="rId34"/>
+    <p:sldId id="274" r:id="rId35"/>
+    <p:sldId id="275" r:id="rId36"/>
+    <p:sldId id="276" r:id="rId37"/>
+    <p:sldId id="277" r:id="rId38"/>
+    <p:sldId id="279" r:id="rId39"/>
+    <p:sldId id="280" r:id="rId40"/>
+    <p:sldId id="281" r:id="rId41"/>
+    <p:sldId id="278" r:id="rId42"/>
+    <p:sldId id="282" r:id="rId43"/>
+    <p:sldId id="296" r:id="rId44"/>
+    <p:sldId id="297" r:id="rId45"/>
+    <p:sldId id="298" r:id="rId46"/>
+    <p:sldId id="299" r:id="rId47"/>
+    <p:sldId id="300" r:id="rId48"/>
+    <p:sldId id="285" r:id="rId49"/>
+    <p:sldId id="260" r:id="rId50"/>
   </p:sldIdLst>
   <p:sldSz cx="12192000" cy="6858000"/>
   <p:notesSz cx="6858000" cy="9144000"/>
@@ -578,7 +582,7 @@
           <a:p>
             <a:fld id="{30355628-B95B-43D3-A7CC-8EAB53814EB1}" type="slidenum">
               <a:rPr lang="en-GB" smtClean="0"/>
-              <a:t>35</a:t>
+              <a:t>39</a:t>
             </a:fld>
             <a:endParaRPr lang="en-GB"/>
           </a:p>
@@ -3895,6 +3899,705 @@
           <p:cNvPr id="2" name="Title 1">
             <a:extLst>
               <a:ext uri="{FF2B5EF4-FFF2-40B4-BE49-F238E27FC236}">
+                <a16:creationId xmlns:a16="http://schemas.microsoft.com/office/drawing/2014/main" id="{D61586A8-0824-49D1-B516-1BD9CF6673A1}"/>
+              </a:ext>
+            </a:extLst>
+          </p:cNvPr>
+          <p:cNvSpPr>
+            <a:spLocks noGrp="1"/>
+          </p:cNvSpPr>
+          <p:nvPr>
+            <p:ph type="title"/>
+          </p:nvPr>
+        </p:nvSpPr>
+        <p:spPr/>
+        <p:txBody>
+          <a:bodyPr/>
+          <a:lstStyle/>
+          <a:p>
+            <a:r>
+              <a:rPr lang="en-GB" dirty="0"/>
+              <a:t>CVS continued</a:t>
+            </a:r>
+          </a:p>
+        </p:txBody>
+      </p:sp>
+      <p:sp>
+        <p:nvSpPr>
+          <p:cNvPr id="3" name="Content Placeholder 2">
+            <a:extLst>
+              <a:ext uri="{FF2B5EF4-FFF2-40B4-BE49-F238E27FC236}">
+                <a16:creationId xmlns:a16="http://schemas.microsoft.com/office/drawing/2014/main" id="{5615D9EE-CD05-4BF1-A655-66971E41C0FB}"/>
+              </a:ext>
+            </a:extLst>
+          </p:cNvPr>
+          <p:cNvSpPr>
+            <a:spLocks noGrp="1"/>
+          </p:cNvSpPr>
+          <p:nvPr>
+            <p:ph idx="1"/>
+          </p:nvPr>
+        </p:nvSpPr>
+        <p:spPr/>
+        <p:txBody>
+          <a:bodyPr>
+            <a:normAutofit/>
+          </a:bodyPr>
+          <a:lstStyle/>
+          <a:p>
+            <a:r>
+              <a:rPr lang="en-GB" dirty="0"/>
+              <a:t>CVS can also maintain different "branches" of a project. </a:t>
+            </a:r>
+          </a:p>
+          <a:p>
+            <a:pPr lvl="1"/>
+            <a:r>
+              <a:rPr lang="en-GB" dirty="0"/>
+              <a:t>For instance, a released version of the software project may form one branch, used for bug fixes, </a:t>
+            </a:r>
+          </a:p>
+          <a:p>
+            <a:pPr lvl="1"/>
+            <a:r>
+              <a:rPr lang="en-GB" dirty="0"/>
+              <a:t>another version under current development, with major changes and new features, can form a separate branch.</a:t>
+            </a:r>
+          </a:p>
+          <a:p>
+            <a:r>
+              <a:rPr lang="en-GB" b="1" dirty="0"/>
+              <a:t>SVN (2000) </a:t>
+            </a:r>
+            <a:r>
+              <a:rPr lang="en-GB" dirty="0"/>
+              <a:t>CVS evolved</a:t>
+            </a:r>
+            <a:r>
+              <a:rPr lang="en-GB" b="1" dirty="0"/>
+              <a:t> </a:t>
+            </a:r>
+            <a:r>
+              <a:rPr lang="en-GB" dirty="0"/>
+              <a:t>with improvements</a:t>
+            </a:r>
+            <a:endParaRPr lang="en-GB" b="1" dirty="0"/>
+          </a:p>
+          <a:p>
+            <a:endParaRPr lang="en-GB" dirty="0"/>
+          </a:p>
+        </p:txBody>
+      </p:sp>
+      <p:pic>
+        <p:nvPicPr>
+          <p:cNvPr id="6" name="Picture 5">
+            <a:extLst>
+              <a:ext uri="{FF2B5EF4-FFF2-40B4-BE49-F238E27FC236}">
+                <a16:creationId xmlns:a16="http://schemas.microsoft.com/office/drawing/2014/main" id="{AE1CC091-4CF7-4053-9338-2495F470EF58}"/>
+              </a:ext>
+            </a:extLst>
+          </p:cNvPr>
+          <p:cNvPicPr>
+            <a:picLocks noChangeAspect="1"/>
+          </p:cNvPicPr>
+          <p:nvPr/>
+        </p:nvPicPr>
+        <p:blipFill>
+          <a:blip r:embed="rId2"/>
+          <a:stretch>
+            <a:fillRect/>
+          </a:stretch>
+        </p:blipFill>
+        <p:spPr>
+          <a:xfrm>
+            <a:off x="10191750" y="5586413"/>
+            <a:ext cx="1545189" cy="914400"/>
+          </a:xfrm>
+          <a:prstGeom prst="rect">
+            <a:avLst/>
+          </a:prstGeom>
+        </p:spPr>
+      </p:pic>
+    </p:spTree>
+    <p:extLst>
+      <p:ext uri="{BB962C8B-B14F-4D97-AF65-F5344CB8AC3E}">
+        <p14:creationId xmlns:p14="http://schemas.microsoft.com/office/powerpoint/2010/main" val="162974868"/>
+      </p:ext>
+    </p:extLst>
+  </p:cSld>
+  <p:clrMapOvr>
+    <a:masterClrMapping/>
+  </p:clrMapOvr>
+</p:sld>
+</file>
+
+<file path=ppt/slides/slide11.xml><?xml version="1.0" encoding="utf-8"?>
+<p:sld xmlns:a="http://schemas.openxmlformats.org/drawingml/2006/main" xmlns:r="http://schemas.openxmlformats.org/officeDocument/2006/relationships" xmlns:p="http://schemas.openxmlformats.org/presentationml/2006/main">
+  <p:cSld>
+    <p:spTree>
+      <p:nvGrpSpPr>
+        <p:cNvPr id="1" name=""/>
+        <p:cNvGrpSpPr/>
+        <p:nvPr/>
+      </p:nvGrpSpPr>
+      <p:grpSpPr>
+        <a:xfrm>
+          <a:off x="0" y="0"/>
+          <a:ext cx="0" cy="0"/>
+          <a:chOff x="0" y="0"/>
+          <a:chExt cx="0" cy="0"/>
+        </a:xfrm>
+      </p:grpSpPr>
+      <p:sp>
+        <p:nvSpPr>
+          <p:cNvPr id="2" name="Title 1">
+            <a:extLst>
+              <a:ext uri="{FF2B5EF4-FFF2-40B4-BE49-F238E27FC236}">
+                <a16:creationId xmlns:a16="http://schemas.microsoft.com/office/drawing/2014/main" id="{D6F3C245-80E0-4CF4-A9CE-479E3B053FDC}"/>
+              </a:ext>
+            </a:extLst>
+          </p:cNvPr>
+          <p:cNvSpPr>
+            <a:spLocks noGrp="1"/>
+          </p:cNvSpPr>
+          <p:nvPr>
+            <p:ph type="title"/>
+          </p:nvPr>
+        </p:nvSpPr>
+        <p:spPr/>
+        <p:txBody>
+          <a:bodyPr/>
+          <a:lstStyle/>
+          <a:p>
+            <a:r>
+              <a:rPr lang="en-GB" dirty="0"/>
+              <a:t>Branches?</a:t>
+            </a:r>
+          </a:p>
+        </p:txBody>
+      </p:sp>
+      <p:sp>
+        <p:nvSpPr>
+          <p:cNvPr id="3" name="Content Placeholder 2">
+            <a:extLst>
+              <a:ext uri="{FF2B5EF4-FFF2-40B4-BE49-F238E27FC236}">
+                <a16:creationId xmlns:a16="http://schemas.microsoft.com/office/drawing/2014/main" id="{149D6315-CE32-4CA1-9567-67A85BE95C19}"/>
+              </a:ext>
+            </a:extLst>
+          </p:cNvPr>
+          <p:cNvSpPr>
+            <a:spLocks noGrp="1"/>
+          </p:cNvSpPr>
+          <p:nvPr>
+            <p:ph idx="1"/>
+          </p:nvPr>
+        </p:nvSpPr>
+        <p:spPr>
+          <a:xfrm>
+            <a:off x="838200" y="1844479"/>
+            <a:ext cx="10515600" cy="4351338"/>
+          </a:xfrm>
+        </p:spPr>
+        <p:txBody>
+          <a:bodyPr/>
+          <a:lstStyle/>
+          <a:p>
+            <a:r>
+              <a:rPr lang="en-GB" dirty="0"/>
+              <a:t>Like as in a tree?</a:t>
+            </a:r>
+          </a:p>
+          <a:p>
+            <a:r>
+              <a:rPr lang="en-GB" dirty="0"/>
+              <a:t>Or more like graph theory</a:t>
+            </a:r>
+          </a:p>
+          <a:p>
+            <a:r>
+              <a:rPr lang="en-GB" dirty="0"/>
+              <a:t>Allows two (or more) parallel version of the files/software to exist at the same time </a:t>
+            </a:r>
+          </a:p>
+          <a:p>
+            <a:endParaRPr lang="en-GB" dirty="0"/>
+          </a:p>
+          <a:p>
+            <a:endParaRPr lang="en-GB" dirty="0"/>
+          </a:p>
+          <a:p>
+            <a:endParaRPr lang="en-GB" dirty="0"/>
+          </a:p>
+          <a:p>
+            <a:r>
+              <a:rPr lang="en-GB" dirty="0"/>
+              <a:t>Usually changes need to be incorporated (merged) across branches</a:t>
+            </a:r>
+          </a:p>
+          <a:p>
+            <a:pPr lvl="1"/>
+            <a:endParaRPr lang="en-GB" dirty="0"/>
+          </a:p>
+        </p:txBody>
+      </p:sp>
+      <p:pic>
+        <p:nvPicPr>
+          <p:cNvPr id="8" name="Picture 7">
+            <a:extLst>
+              <a:ext uri="{FF2B5EF4-FFF2-40B4-BE49-F238E27FC236}">
+                <a16:creationId xmlns:a16="http://schemas.microsoft.com/office/drawing/2014/main" id="{EDCB9A8A-33E7-46EA-9D79-FF5C97C52207}"/>
+              </a:ext>
+            </a:extLst>
+          </p:cNvPr>
+          <p:cNvPicPr>
+            <a:picLocks noChangeAspect="1"/>
+          </p:cNvPicPr>
+          <p:nvPr/>
+        </p:nvPicPr>
+        <p:blipFill>
+          <a:blip r:embed="rId2"/>
+          <a:stretch>
+            <a:fillRect/>
+          </a:stretch>
+        </p:blipFill>
+        <p:spPr>
+          <a:xfrm>
+            <a:off x="8452236" y="3697357"/>
+            <a:ext cx="2118739" cy="1221656"/>
+          </a:xfrm>
+          <a:prstGeom prst="rect">
+            <a:avLst/>
+          </a:prstGeom>
+        </p:spPr>
+      </p:pic>
+    </p:spTree>
+    <p:extLst>
+      <p:ext uri="{BB962C8B-B14F-4D97-AF65-F5344CB8AC3E}">
+        <p14:creationId xmlns:p14="http://schemas.microsoft.com/office/powerpoint/2010/main" val="3699011617"/>
+      </p:ext>
+    </p:extLst>
+  </p:cSld>
+  <p:clrMapOvr>
+    <a:masterClrMapping/>
+  </p:clrMapOvr>
+</p:sld>
+</file>
+
+<file path=ppt/slides/slide12.xml><?xml version="1.0" encoding="utf-8"?>
+<p:sld xmlns:a="http://schemas.openxmlformats.org/drawingml/2006/main" xmlns:r="http://schemas.openxmlformats.org/officeDocument/2006/relationships" xmlns:p="http://schemas.openxmlformats.org/presentationml/2006/main">
+  <p:cSld>
+    <p:spTree>
+      <p:nvGrpSpPr>
+        <p:cNvPr id="1" name=""/>
+        <p:cNvGrpSpPr/>
+        <p:nvPr/>
+      </p:nvGrpSpPr>
+      <p:grpSpPr>
+        <a:xfrm>
+          <a:off x="0" y="0"/>
+          <a:ext cx="0" cy="0"/>
+          <a:chOff x="0" y="0"/>
+          <a:chExt cx="0" cy="0"/>
+        </a:xfrm>
+      </p:grpSpPr>
+      <p:sp>
+        <p:nvSpPr>
+          <p:cNvPr id="2" name="Title 1">
+            <a:extLst>
+              <a:ext uri="{FF2B5EF4-FFF2-40B4-BE49-F238E27FC236}">
+                <a16:creationId xmlns:a16="http://schemas.microsoft.com/office/drawing/2014/main" id="{D6F3C245-80E0-4CF4-A9CE-479E3B053FDC}"/>
+              </a:ext>
+            </a:extLst>
+          </p:cNvPr>
+          <p:cNvSpPr>
+            <a:spLocks noGrp="1"/>
+          </p:cNvSpPr>
+          <p:nvPr>
+            <p:ph type="title"/>
+          </p:nvPr>
+        </p:nvSpPr>
+        <p:spPr/>
+        <p:txBody>
+          <a:bodyPr/>
+          <a:lstStyle/>
+          <a:p>
+            <a:r>
+              <a:rPr lang="en-GB" dirty="0"/>
+              <a:t>Branches?</a:t>
+            </a:r>
+          </a:p>
+        </p:txBody>
+      </p:sp>
+      <p:sp>
+        <p:nvSpPr>
+          <p:cNvPr id="3" name="Content Placeholder 2">
+            <a:extLst>
+              <a:ext uri="{FF2B5EF4-FFF2-40B4-BE49-F238E27FC236}">
+                <a16:creationId xmlns:a16="http://schemas.microsoft.com/office/drawing/2014/main" id="{149D6315-CE32-4CA1-9567-67A85BE95C19}"/>
+              </a:ext>
+            </a:extLst>
+          </p:cNvPr>
+          <p:cNvSpPr>
+            <a:spLocks noGrp="1"/>
+          </p:cNvSpPr>
+          <p:nvPr>
+            <p:ph idx="1"/>
+          </p:nvPr>
+        </p:nvSpPr>
+        <p:spPr>
+          <a:xfrm>
+            <a:off x="838200" y="1844479"/>
+            <a:ext cx="10515600" cy="4351338"/>
+          </a:xfrm>
+        </p:spPr>
+        <p:txBody>
+          <a:bodyPr/>
+          <a:lstStyle/>
+          <a:p>
+            <a:r>
+              <a:rPr lang="en-GB" dirty="0"/>
+              <a:t>Many different approaches and strategies</a:t>
+            </a:r>
+          </a:p>
+          <a:p>
+            <a:r>
+              <a:rPr lang="en-GB" dirty="0"/>
+              <a:t>There should (and usually is) a specific reason for adopting a strategy and should always be justified</a:t>
+            </a:r>
+          </a:p>
+          <a:p>
+            <a:r>
+              <a:rPr lang="en-GB" dirty="0"/>
+              <a:t>A topic to itself with plenty of differing opinions</a:t>
+            </a:r>
+          </a:p>
+          <a:p>
+            <a:r>
+              <a:rPr lang="en-GB" dirty="0"/>
+              <a:t>Undeniable truths </a:t>
+            </a:r>
+          </a:p>
+          <a:p>
+            <a:pPr lvl="1"/>
+            <a:r>
+              <a:rPr lang="en-GB" dirty="0"/>
+              <a:t>They introduce complexity </a:t>
+            </a:r>
+          </a:p>
+          <a:p>
+            <a:pPr lvl="1"/>
+            <a:r>
+              <a:rPr lang="en-GB" dirty="0"/>
+              <a:t>The longer they exist and diverge, the harder the merge</a:t>
+            </a:r>
+          </a:p>
+          <a:p>
+            <a:pPr lvl="1"/>
+            <a:r>
+              <a:rPr lang="en-GB" dirty="0"/>
+              <a:t>(fondly referred to as merge parties)</a:t>
+            </a:r>
+          </a:p>
+          <a:p>
+            <a:pPr lvl="1"/>
+            <a:endParaRPr lang="en-GB" dirty="0"/>
+          </a:p>
+          <a:p>
+            <a:pPr lvl="1"/>
+            <a:endParaRPr lang="en-GB" dirty="0"/>
+          </a:p>
+        </p:txBody>
+      </p:sp>
+      <p:pic>
+        <p:nvPicPr>
+          <p:cNvPr id="4" name="Picture 3">
+            <a:extLst>
+              <a:ext uri="{FF2B5EF4-FFF2-40B4-BE49-F238E27FC236}">
+                <a16:creationId xmlns:a16="http://schemas.microsoft.com/office/drawing/2014/main" id="{CA97A125-94DE-4A7A-8DF0-FDCBEE0FA319}"/>
+              </a:ext>
+            </a:extLst>
+          </p:cNvPr>
+          <p:cNvPicPr>
+            <a:picLocks noChangeAspect="1"/>
+          </p:cNvPicPr>
+          <p:nvPr/>
+        </p:nvPicPr>
+        <p:blipFill>
+          <a:blip r:embed="rId2"/>
+          <a:stretch>
+            <a:fillRect/>
+          </a:stretch>
+        </p:blipFill>
+        <p:spPr>
+          <a:xfrm>
+            <a:off x="3803858" y="258650"/>
+            <a:ext cx="2672357" cy="1225317"/>
+          </a:xfrm>
+          <a:prstGeom prst="rect">
+            <a:avLst/>
+          </a:prstGeom>
+        </p:spPr>
+      </p:pic>
+      <p:pic>
+        <p:nvPicPr>
+          <p:cNvPr id="5" name="Picture 4">
+            <a:extLst>
+              <a:ext uri="{FF2B5EF4-FFF2-40B4-BE49-F238E27FC236}">
+                <a16:creationId xmlns:a16="http://schemas.microsoft.com/office/drawing/2014/main" id="{685E1424-ACBD-4771-890F-14A87FAB4A86}"/>
+              </a:ext>
+            </a:extLst>
+          </p:cNvPr>
+          <p:cNvPicPr>
+            <a:picLocks noChangeAspect="1"/>
+          </p:cNvPicPr>
+          <p:nvPr/>
+        </p:nvPicPr>
+        <p:blipFill>
+          <a:blip r:embed="rId3"/>
+          <a:stretch>
+            <a:fillRect/>
+          </a:stretch>
+        </p:blipFill>
+        <p:spPr>
+          <a:xfrm>
+            <a:off x="8181138" y="591296"/>
+            <a:ext cx="3324225" cy="1323975"/>
+          </a:xfrm>
+          <a:prstGeom prst="rect">
+            <a:avLst/>
+          </a:prstGeom>
+        </p:spPr>
+      </p:pic>
+      <p:pic>
+        <p:nvPicPr>
+          <p:cNvPr id="6" name="Picture 5">
+            <a:extLst>
+              <a:ext uri="{FF2B5EF4-FFF2-40B4-BE49-F238E27FC236}">
+                <a16:creationId xmlns:a16="http://schemas.microsoft.com/office/drawing/2014/main" id="{27CE5729-6718-44E5-85D7-70E90D597B05}"/>
+              </a:ext>
+            </a:extLst>
+          </p:cNvPr>
+          <p:cNvPicPr>
+            <a:picLocks noChangeAspect="1"/>
+          </p:cNvPicPr>
+          <p:nvPr/>
+        </p:nvPicPr>
+        <p:blipFill>
+          <a:blip r:embed="rId4"/>
+          <a:stretch>
+            <a:fillRect/>
+          </a:stretch>
+        </p:blipFill>
+        <p:spPr>
+          <a:xfrm>
+            <a:off x="9648221" y="5011357"/>
+            <a:ext cx="2173788" cy="1544972"/>
+          </a:xfrm>
+          <a:prstGeom prst="rect">
+            <a:avLst/>
+          </a:prstGeom>
+        </p:spPr>
+      </p:pic>
+      <p:pic>
+        <p:nvPicPr>
+          <p:cNvPr id="7" name="Picture 6">
+            <a:extLst>
+              <a:ext uri="{FF2B5EF4-FFF2-40B4-BE49-F238E27FC236}">
+                <a16:creationId xmlns:a16="http://schemas.microsoft.com/office/drawing/2014/main" id="{D2C7F0FD-5DB9-4306-84A7-0ACDD207B37A}"/>
+              </a:ext>
+            </a:extLst>
+          </p:cNvPr>
+          <p:cNvPicPr>
+            <a:picLocks noChangeAspect="1"/>
+          </p:cNvPicPr>
+          <p:nvPr/>
+        </p:nvPicPr>
+        <p:blipFill>
+          <a:blip r:embed="rId5"/>
+          <a:stretch>
+            <a:fillRect/>
+          </a:stretch>
+        </p:blipFill>
+        <p:spPr>
+          <a:xfrm>
+            <a:off x="9205937" y="3310871"/>
+            <a:ext cx="2821206" cy="1489345"/>
+          </a:xfrm>
+          <a:prstGeom prst="rect">
+            <a:avLst/>
+          </a:prstGeom>
+        </p:spPr>
+      </p:pic>
+    </p:spTree>
+    <p:extLst>
+      <p:ext uri="{BB962C8B-B14F-4D97-AF65-F5344CB8AC3E}">
+        <p14:creationId xmlns:p14="http://schemas.microsoft.com/office/powerpoint/2010/main" val="2069769236"/>
+      </p:ext>
+    </p:extLst>
+  </p:cSld>
+  <p:clrMapOvr>
+    <a:masterClrMapping/>
+  </p:clrMapOvr>
+</p:sld>
+</file>
+
+<file path=ppt/slides/slide13.xml><?xml version="1.0" encoding="utf-8"?>
+<p:sld xmlns:a="http://schemas.openxmlformats.org/drawingml/2006/main" xmlns:r="http://schemas.openxmlformats.org/officeDocument/2006/relationships" xmlns:p="http://schemas.openxmlformats.org/presentationml/2006/main">
+  <p:cSld>
+    <p:spTree>
+      <p:nvGrpSpPr>
+        <p:cNvPr id="1" name=""/>
+        <p:cNvGrpSpPr/>
+        <p:nvPr/>
+      </p:nvGrpSpPr>
+      <p:grpSpPr>
+        <a:xfrm>
+          <a:off x="0" y="0"/>
+          <a:ext cx="0" cy="0"/>
+          <a:chOff x="0" y="0"/>
+          <a:chExt cx="0" cy="0"/>
+        </a:xfrm>
+      </p:grpSpPr>
+      <p:sp>
+        <p:nvSpPr>
+          <p:cNvPr id="2" name="Title 1">
+            <a:extLst>
+              <a:ext uri="{FF2B5EF4-FFF2-40B4-BE49-F238E27FC236}">
+                <a16:creationId xmlns:a16="http://schemas.microsoft.com/office/drawing/2014/main" id="{74832897-E955-4172-BEA9-8F1B86779F48}"/>
+              </a:ext>
+            </a:extLst>
+          </p:cNvPr>
+          <p:cNvSpPr>
+            <a:spLocks noGrp="1"/>
+          </p:cNvSpPr>
+          <p:nvPr>
+            <p:ph type="title"/>
+          </p:nvPr>
+        </p:nvSpPr>
+        <p:spPr/>
+        <p:txBody>
+          <a:bodyPr/>
+          <a:lstStyle/>
+          <a:p>
+            <a:r>
+              <a:rPr lang="en-GB" dirty="0"/>
+              <a:t>Source Control Today – Rise of the DVCS</a:t>
+            </a:r>
+          </a:p>
+        </p:txBody>
+      </p:sp>
+      <p:sp>
+        <p:nvSpPr>
+          <p:cNvPr id="3" name="Content Placeholder 2">
+            <a:extLst>
+              <a:ext uri="{FF2B5EF4-FFF2-40B4-BE49-F238E27FC236}">
+                <a16:creationId xmlns:a16="http://schemas.microsoft.com/office/drawing/2014/main" id="{DB8E8E41-8EC7-4475-A390-E2DC23C5E2C4}"/>
+              </a:ext>
+            </a:extLst>
+          </p:cNvPr>
+          <p:cNvSpPr>
+            <a:spLocks noGrp="1"/>
+          </p:cNvSpPr>
+          <p:nvPr>
+            <p:ph idx="1"/>
+          </p:nvPr>
+        </p:nvSpPr>
+        <p:spPr/>
+        <p:txBody>
+          <a:bodyPr>
+            <a:normAutofit/>
+          </a:bodyPr>
+          <a:lstStyle/>
+          <a:p>
+            <a:r>
+              <a:rPr lang="en-GB" dirty="0"/>
+              <a:t>Distributed means no “real” central repository</a:t>
+            </a:r>
+          </a:p>
+          <a:p>
+            <a:pPr lvl="1"/>
+            <a:r>
+              <a:rPr lang="en-GB" dirty="0"/>
+              <a:t>Although, there is usually a repository that is treated like the main central repository</a:t>
+            </a:r>
+          </a:p>
+          <a:p>
+            <a:r>
+              <a:rPr lang="en-GB" dirty="0"/>
+              <a:t>GIT</a:t>
+            </a:r>
+          </a:p>
+          <a:p>
+            <a:pPr lvl="1"/>
+            <a:r>
+              <a:rPr lang="en-GB" dirty="0"/>
+              <a:t>Linus’s replacement for </a:t>
+            </a:r>
+            <a:r>
+              <a:rPr lang="en-GB" dirty="0" err="1"/>
+              <a:t>BitKeeper</a:t>
+            </a:r>
+            <a:endParaRPr lang="en-GB" dirty="0"/>
+          </a:p>
+          <a:p>
+            <a:r>
+              <a:rPr lang="en-GB" dirty="0"/>
+              <a:t>Mercurial</a:t>
+            </a:r>
+          </a:p>
+          <a:p>
+            <a:pPr lvl="1"/>
+            <a:r>
+              <a:rPr lang="en-GB" dirty="0"/>
+              <a:t>Say what? – this is GIT’s evil twin</a:t>
+            </a:r>
+          </a:p>
+          <a:p>
+            <a:pPr marL="0" indent="0">
+              <a:buNone/>
+            </a:pPr>
+            <a:r>
+              <a:rPr lang="en-GB" dirty="0"/>
+              <a:t>	</a:t>
+            </a:r>
+          </a:p>
+        </p:txBody>
+      </p:sp>
+    </p:spTree>
+    <p:extLst>
+      <p:ext uri="{BB962C8B-B14F-4D97-AF65-F5344CB8AC3E}">
+        <p14:creationId xmlns:p14="http://schemas.microsoft.com/office/powerpoint/2010/main" val="320971741"/>
+      </p:ext>
+    </p:extLst>
+  </p:cSld>
+  <p:clrMapOvr>
+    <a:masterClrMapping/>
+  </p:clrMapOvr>
+</p:sld>
+</file>
+
+<file path=ppt/slides/slide14.xml><?xml version="1.0" encoding="utf-8"?>
+<p:sld xmlns:a="http://schemas.openxmlformats.org/drawingml/2006/main" xmlns:r="http://schemas.openxmlformats.org/officeDocument/2006/relationships" xmlns:p="http://schemas.openxmlformats.org/presentationml/2006/main">
+  <p:cSld>
+    <p:spTree>
+      <p:nvGrpSpPr>
+        <p:cNvPr id="1" name=""/>
+        <p:cNvGrpSpPr/>
+        <p:nvPr/>
+      </p:nvGrpSpPr>
+      <p:grpSpPr>
+        <a:xfrm>
+          <a:off x="0" y="0"/>
+          <a:ext cx="0" cy="0"/>
+          <a:chOff x="0" y="0"/>
+          <a:chExt cx="0" cy="0"/>
+        </a:xfrm>
+      </p:grpSpPr>
+      <p:sp>
+        <p:nvSpPr>
+          <p:cNvPr id="2" name="Title 1">
+            <a:extLst>
+              <a:ext uri="{FF2B5EF4-FFF2-40B4-BE49-F238E27FC236}">
                 <a16:creationId xmlns:a16="http://schemas.microsoft.com/office/drawing/2014/main" id="{DD2F2F2C-8DF3-47FE-AF5D-348C6A5EA9F6}"/>
               </a:ext>
             </a:extLst>
@@ -3968,7 +4671,7 @@
 </p:sld>
 </file>
 
-<file path=ppt/slides/slide11.xml><?xml version="1.0" encoding="utf-8"?>
+<file path=ppt/slides/slide15.xml><?xml version="1.0" encoding="utf-8"?>
 <p:sld xmlns:a="http://schemas.openxmlformats.org/drawingml/2006/main" xmlns:r="http://schemas.openxmlformats.org/officeDocument/2006/relationships" xmlns:p="http://schemas.openxmlformats.org/presentationml/2006/main">
   <p:cSld>
     <p:spTree>
@@ -4109,7 +4812,7 @@
 </p:sld>
 </file>
 
-<file path=ppt/slides/slide12.xml><?xml version="1.0" encoding="utf-8"?>
+<file path=ppt/slides/slide16.xml><?xml version="1.0" encoding="utf-8"?>
 <p:sld xmlns:a="http://schemas.openxmlformats.org/drawingml/2006/main" xmlns:r="http://schemas.openxmlformats.org/officeDocument/2006/relationships" xmlns:p="http://schemas.openxmlformats.org/presentationml/2006/main">
   <p:cSld>
     <p:spTree>
@@ -4295,7 +4998,7 @@
 </p:sld>
 </file>
 
-<file path=ppt/slides/slide13.xml><?xml version="1.0" encoding="utf-8"?>
+<file path=ppt/slides/slide17.xml><?xml version="1.0" encoding="utf-8"?>
 <p:sld xmlns:a="http://schemas.openxmlformats.org/drawingml/2006/main" xmlns:r="http://schemas.openxmlformats.org/officeDocument/2006/relationships" xmlns:p="http://schemas.openxmlformats.org/presentationml/2006/main">
   <p:cSld>
     <p:spTree>
@@ -4378,7 +5081,7 @@
 </p:sld>
 </file>
 
-<file path=ppt/slides/slide14.xml><?xml version="1.0" encoding="utf-8"?>
+<file path=ppt/slides/slide18.xml><?xml version="1.0" encoding="utf-8"?>
 <p:sld xmlns:a="http://schemas.openxmlformats.org/drawingml/2006/main" xmlns:r="http://schemas.openxmlformats.org/officeDocument/2006/relationships" xmlns:p="http://schemas.openxmlformats.org/presentationml/2006/main">
   <p:cSld>
     <p:spTree>
@@ -4483,7 +5186,7 @@
 </p:sld>
 </file>
 
-<file path=ppt/slides/slide15.xml><?xml version="1.0" encoding="utf-8"?>
+<file path=ppt/slides/slide19.xml><?xml version="1.0" encoding="utf-8"?>
 <p:sld xmlns:a="http://schemas.openxmlformats.org/drawingml/2006/main" xmlns:r="http://schemas.openxmlformats.org/officeDocument/2006/relationships" xmlns:p="http://schemas.openxmlformats.org/presentationml/2006/main">
   <p:cSld>
     <p:spTree>
@@ -5006,7 +5709,117 @@
 </p:sld>
 </file>
 
-<file path=ppt/slides/slide16.xml><?xml version="1.0" encoding="utf-8"?>
+<file path=ppt/slides/slide2.xml><?xml version="1.0" encoding="utf-8"?>
+<p:sld xmlns:a="http://schemas.openxmlformats.org/drawingml/2006/main" xmlns:r="http://schemas.openxmlformats.org/officeDocument/2006/relationships" xmlns:p="http://schemas.openxmlformats.org/presentationml/2006/main">
+  <p:cSld>
+    <p:spTree>
+      <p:nvGrpSpPr>
+        <p:cNvPr id="1" name=""/>
+        <p:cNvGrpSpPr/>
+        <p:nvPr/>
+      </p:nvGrpSpPr>
+      <p:grpSpPr>
+        <a:xfrm>
+          <a:off x="0" y="0"/>
+          <a:ext cx="0" cy="0"/>
+          <a:chOff x="0" y="0"/>
+          <a:chExt cx="0" cy="0"/>
+        </a:xfrm>
+      </p:grpSpPr>
+      <p:sp>
+        <p:nvSpPr>
+          <p:cNvPr id="2" name="Title 1">
+            <a:extLst>
+              <a:ext uri="{FF2B5EF4-FFF2-40B4-BE49-F238E27FC236}">
+                <a16:creationId xmlns:a16="http://schemas.microsoft.com/office/drawing/2014/main" id="{88558DF3-96DF-4DC9-A0F0-6775B3271E10}"/>
+              </a:ext>
+            </a:extLst>
+          </p:cNvPr>
+          <p:cNvSpPr>
+            <a:spLocks noGrp="1"/>
+          </p:cNvSpPr>
+          <p:nvPr>
+            <p:ph type="title"/>
+          </p:nvPr>
+        </p:nvSpPr>
+        <p:spPr/>
+        <p:txBody>
+          <a:bodyPr/>
+          <a:lstStyle/>
+          <a:p>
+            <a:r>
+              <a:rPr lang="en-GB" dirty="0"/>
+              <a:t>Definition</a:t>
+            </a:r>
+          </a:p>
+        </p:txBody>
+      </p:sp>
+      <p:sp>
+        <p:nvSpPr>
+          <p:cNvPr id="3" name="Content Placeholder 2">
+            <a:extLst>
+              <a:ext uri="{FF2B5EF4-FFF2-40B4-BE49-F238E27FC236}">
+                <a16:creationId xmlns:a16="http://schemas.microsoft.com/office/drawing/2014/main" id="{9E85A9B9-7C1D-48E6-97A1-2E4C15C9DF5C}"/>
+              </a:ext>
+            </a:extLst>
+          </p:cNvPr>
+          <p:cNvSpPr>
+            <a:spLocks noGrp="1"/>
+          </p:cNvSpPr>
+          <p:nvPr>
+            <p:ph idx="1"/>
+          </p:nvPr>
+        </p:nvSpPr>
+        <p:spPr/>
+        <p:txBody>
+          <a:bodyPr/>
+          <a:lstStyle/>
+          <a:p>
+            <a:r>
+              <a:rPr lang="en-GB" dirty="0"/>
+              <a:t>A component of software configuration management, version </a:t>
+            </a:r>
+            <a:r>
+              <a:rPr lang="en-GB" b="1" dirty="0"/>
+              <a:t>control</a:t>
+            </a:r>
+            <a:r>
+              <a:rPr lang="en-GB" dirty="0"/>
+              <a:t>, also known as revision </a:t>
+            </a:r>
+            <a:r>
+              <a:rPr lang="en-GB" b="1" dirty="0"/>
+              <a:t>control</a:t>
+            </a:r>
+            <a:r>
+              <a:rPr lang="en-GB" dirty="0"/>
+              <a:t> or </a:t>
+            </a:r>
+            <a:r>
+              <a:rPr lang="en-GB" b="1" dirty="0"/>
+              <a:t>source control</a:t>
+            </a:r>
+            <a:r>
+              <a:rPr lang="en-GB" dirty="0"/>
+              <a:t>, is the management of changes to documents, computer programs, large web sites, and other collections of information.</a:t>
+            </a:r>
+          </a:p>
+        </p:txBody>
+      </p:sp>
+    </p:spTree>
+    <p:extLst>
+      <p:ext uri="{BB962C8B-B14F-4D97-AF65-F5344CB8AC3E}">
+        <p14:creationId xmlns:p14="http://schemas.microsoft.com/office/powerpoint/2010/main" val="219066995"/>
+      </p:ext>
+    </p:extLst>
+  </p:cSld>
+  <p:clrMapOvr>
+    <a:masterClrMapping/>
+  </p:clrMapOvr>
+</p:sld>
+</file>
+
+<file path=ppt/slides/slide20.xml><?xml version="1.0" encoding="utf-8"?>
 <p:sld xmlns:a="http://schemas.openxmlformats.org/drawingml/2006/main" xmlns:r="http://schemas.openxmlformats.org/officeDocument/2006/relationships" xmlns:p="http://schemas.openxmlformats.org/presentationml/2006/main">
   <p:cSld>
     <p:spTree>
@@ -5147,7 +5960,7 @@
 </p:sld>
 </file>
 
-<file path=ppt/slides/slide17.xml><?xml version="1.0" encoding="utf-8"?>
+<file path=ppt/slides/slide21.xml><?xml version="1.0" encoding="utf-8"?>
 <p:sld xmlns:a="http://schemas.openxmlformats.org/drawingml/2006/main" xmlns:r="http://schemas.openxmlformats.org/officeDocument/2006/relationships" xmlns:p="http://schemas.openxmlformats.org/presentationml/2006/main">
   <p:cSld>
     <p:spTree>
@@ -5287,7 +6100,7 @@
 </p:sld>
 </file>
 
-<file path=ppt/slides/slide18.xml><?xml version="1.0" encoding="utf-8"?>
+<file path=ppt/slides/slide22.xml><?xml version="1.0" encoding="utf-8"?>
 <p:sld xmlns:a="http://schemas.openxmlformats.org/drawingml/2006/main" xmlns:r="http://schemas.openxmlformats.org/officeDocument/2006/relationships" xmlns:p="http://schemas.openxmlformats.org/presentationml/2006/main">
   <p:cSld>
     <p:spTree>
@@ -5379,7 +6192,7 @@
 </p:sld>
 </file>
 
-<file path=ppt/slides/slide19.xml><?xml version="1.0" encoding="utf-8"?>
+<file path=ppt/slides/slide23.xml><?xml version="1.0" encoding="utf-8"?>
 <p:sld xmlns:a="http://schemas.openxmlformats.org/drawingml/2006/main" xmlns:r="http://schemas.openxmlformats.org/officeDocument/2006/relationships" xmlns:p="http://schemas.openxmlformats.org/presentationml/2006/main">
   <p:cSld>
     <p:spTree>
@@ -5465,117 +6278,7 @@
 </p:sld>
 </file>
 
-<file path=ppt/slides/slide2.xml><?xml version="1.0" encoding="utf-8"?>
-<p:sld xmlns:a="http://schemas.openxmlformats.org/drawingml/2006/main" xmlns:r="http://schemas.openxmlformats.org/officeDocument/2006/relationships" xmlns:p="http://schemas.openxmlformats.org/presentationml/2006/main">
-  <p:cSld>
-    <p:spTree>
-      <p:nvGrpSpPr>
-        <p:cNvPr id="1" name=""/>
-        <p:cNvGrpSpPr/>
-        <p:nvPr/>
-      </p:nvGrpSpPr>
-      <p:grpSpPr>
-        <a:xfrm>
-          <a:off x="0" y="0"/>
-          <a:ext cx="0" cy="0"/>
-          <a:chOff x="0" y="0"/>
-          <a:chExt cx="0" cy="0"/>
-        </a:xfrm>
-      </p:grpSpPr>
-      <p:sp>
-        <p:nvSpPr>
-          <p:cNvPr id="2" name="Title 1">
-            <a:extLst>
-              <a:ext uri="{FF2B5EF4-FFF2-40B4-BE49-F238E27FC236}">
-                <a16:creationId xmlns:a16="http://schemas.microsoft.com/office/drawing/2014/main" id="{88558DF3-96DF-4DC9-A0F0-6775B3271E10}"/>
-              </a:ext>
-            </a:extLst>
-          </p:cNvPr>
-          <p:cNvSpPr>
-            <a:spLocks noGrp="1"/>
-          </p:cNvSpPr>
-          <p:nvPr>
-            <p:ph type="title"/>
-          </p:nvPr>
-        </p:nvSpPr>
-        <p:spPr/>
-        <p:txBody>
-          <a:bodyPr/>
-          <a:lstStyle/>
-          <a:p>
-            <a:r>
-              <a:rPr lang="en-GB" dirty="0"/>
-              <a:t>Definition</a:t>
-            </a:r>
-          </a:p>
-        </p:txBody>
-      </p:sp>
-      <p:sp>
-        <p:nvSpPr>
-          <p:cNvPr id="3" name="Content Placeholder 2">
-            <a:extLst>
-              <a:ext uri="{FF2B5EF4-FFF2-40B4-BE49-F238E27FC236}">
-                <a16:creationId xmlns:a16="http://schemas.microsoft.com/office/drawing/2014/main" id="{9E85A9B9-7C1D-48E6-97A1-2E4C15C9DF5C}"/>
-              </a:ext>
-            </a:extLst>
-          </p:cNvPr>
-          <p:cNvSpPr>
-            <a:spLocks noGrp="1"/>
-          </p:cNvSpPr>
-          <p:nvPr>
-            <p:ph idx="1"/>
-          </p:nvPr>
-        </p:nvSpPr>
-        <p:spPr/>
-        <p:txBody>
-          <a:bodyPr/>
-          <a:lstStyle/>
-          <a:p>
-            <a:r>
-              <a:rPr lang="en-GB" dirty="0"/>
-              <a:t>A component of software configuration management, version </a:t>
-            </a:r>
-            <a:r>
-              <a:rPr lang="en-GB" b="1" dirty="0"/>
-              <a:t>control</a:t>
-            </a:r>
-            <a:r>
-              <a:rPr lang="en-GB" dirty="0"/>
-              <a:t>, also known as revision </a:t>
-            </a:r>
-            <a:r>
-              <a:rPr lang="en-GB" b="1" dirty="0"/>
-              <a:t>control</a:t>
-            </a:r>
-            <a:r>
-              <a:rPr lang="en-GB" dirty="0"/>
-              <a:t> or </a:t>
-            </a:r>
-            <a:r>
-              <a:rPr lang="en-GB" b="1" dirty="0"/>
-              <a:t>source control</a:t>
-            </a:r>
-            <a:r>
-              <a:rPr lang="en-GB" dirty="0"/>
-              <a:t>, is the management of changes to documents, computer programs, large web sites, and other collections of information.</a:t>
-            </a:r>
-          </a:p>
-        </p:txBody>
-      </p:sp>
-    </p:spTree>
-    <p:extLst>
-      <p:ext uri="{BB962C8B-B14F-4D97-AF65-F5344CB8AC3E}">
-        <p14:creationId xmlns:p14="http://schemas.microsoft.com/office/powerpoint/2010/main" val="219066995"/>
-      </p:ext>
-    </p:extLst>
-  </p:cSld>
-  <p:clrMapOvr>
-    <a:masterClrMapping/>
-  </p:clrMapOvr>
-</p:sld>
-</file>
-
-<file path=ppt/slides/slide20.xml><?xml version="1.0" encoding="utf-8"?>
+<file path=ppt/slides/slide24.xml><?xml version="1.0" encoding="utf-8"?>
 <p:sld xmlns:a="http://schemas.openxmlformats.org/drawingml/2006/main" xmlns:r="http://schemas.openxmlformats.org/officeDocument/2006/relationships" xmlns:p="http://schemas.openxmlformats.org/presentationml/2006/main">
   <p:cSld>
     <p:spTree>
@@ -5635,7 +6338,7 @@
 </p:sld>
 </file>
 
-<file path=ppt/slides/slide21.xml><?xml version="1.0" encoding="utf-8"?>
+<file path=ppt/slides/slide25.xml><?xml version="1.0" encoding="utf-8"?>
 <p:sld xmlns:a="http://schemas.openxmlformats.org/drawingml/2006/main" xmlns:r="http://schemas.openxmlformats.org/officeDocument/2006/relationships" xmlns:p="http://schemas.openxmlformats.org/presentationml/2006/main">
   <p:cSld>
     <p:spTree>
@@ -5757,7 +6460,7 @@
 </p:sld>
 </file>
 
-<file path=ppt/slides/slide22.xml><?xml version="1.0" encoding="utf-8"?>
+<file path=ppt/slides/slide26.xml><?xml version="1.0" encoding="utf-8"?>
 <p:sld xmlns:a="http://schemas.openxmlformats.org/drawingml/2006/main" xmlns:r="http://schemas.openxmlformats.org/officeDocument/2006/relationships" xmlns:p="http://schemas.openxmlformats.org/presentationml/2006/main">
   <p:cSld>
     <p:spTree>
@@ -5901,7 +6604,7 @@
 </p:sld>
 </file>
 
-<file path=ppt/slides/slide23.xml><?xml version="1.0" encoding="utf-8"?>
+<file path=ppt/slides/slide27.xml><?xml version="1.0" encoding="utf-8"?>
 <p:sld xmlns:a="http://schemas.openxmlformats.org/drawingml/2006/main" xmlns:r="http://schemas.openxmlformats.org/officeDocument/2006/relationships" xmlns:p="http://schemas.openxmlformats.org/presentationml/2006/main">
   <p:cSld>
     <p:spTree>
@@ -6029,7 +6732,7 @@
 </p:sld>
 </file>
 
-<file path=ppt/slides/slide24.xml><?xml version="1.0" encoding="utf-8"?>
+<file path=ppt/slides/slide28.xml><?xml version="1.0" encoding="utf-8"?>
 <p:sld xmlns:a="http://schemas.openxmlformats.org/drawingml/2006/main" xmlns:r="http://schemas.openxmlformats.org/officeDocument/2006/relationships" xmlns:p="http://schemas.openxmlformats.org/presentationml/2006/main">
   <p:cSld>
     <p:spTree>
@@ -6165,7 +6868,7 @@
 </p:sld>
 </file>
 
-<file path=ppt/slides/slide25.xml><?xml version="1.0" encoding="utf-8"?>
+<file path=ppt/slides/slide29.xml><?xml version="1.0" encoding="utf-8"?>
 <p:sld xmlns:a="http://schemas.openxmlformats.org/drawingml/2006/main" xmlns:r="http://schemas.openxmlformats.org/officeDocument/2006/relationships" xmlns:p="http://schemas.openxmlformats.org/presentationml/2006/main">
   <p:cSld>
     <p:spTree>
@@ -6343,7 +7046,104 @@
 </p:sld>
 </file>
 
-<file path=ppt/slides/slide26.xml><?xml version="1.0" encoding="utf-8"?>
+<file path=ppt/slides/slide3.xml><?xml version="1.0" encoding="utf-8"?>
+<p:sld xmlns:a="http://schemas.openxmlformats.org/drawingml/2006/main" xmlns:r="http://schemas.openxmlformats.org/officeDocument/2006/relationships" xmlns:p="http://schemas.openxmlformats.org/presentationml/2006/main">
+  <p:cSld>
+    <p:spTree>
+      <p:nvGrpSpPr>
+        <p:cNvPr id="1" name=""/>
+        <p:cNvGrpSpPr/>
+        <p:nvPr/>
+      </p:nvGrpSpPr>
+      <p:grpSpPr>
+        <a:xfrm>
+          <a:off x="0" y="0"/>
+          <a:ext cx="0" cy="0"/>
+          <a:chOff x="0" y="0"/>
+          <a:chExt cx="0" cy="0"/>
+        </a:xfrm>
+      </p:grpSpPr>
+      <p:sp>
+        <p:nvSpPr>
+          <p:cNvPr id="2" name="Title 1">
+            <a:extLst>
+              <a:ext uri="{FF2B5EF4-FFF2-40B4-BE49-F238E27FC236}">
+                <a16:creationId xmlns:a16="http://schemas.microsoft.com/office/drawing/2014/main" id="{740A911E-6BDC-4E52-AB0F-7D2DCA233C16}"/>
+              </a:ext>
+            </a:extLst>
+          </p:cNvPr>
+          <p:cNvSpPr>
+            <a:spLocks noGrp="1"/>
+          </p:cNvSpPr>
+          <p:nvPr>
+            <p:ph type="title"/>
+          </p:nvPr>
+        </p:nvSpPr>
+        <p:spPr/>
+        <p:txBody>
+          <a:bodyPr/>
+          <a:lstStyle/>
+          <a:p>
+            <a:r>
+              <a:rPr lang="en-GB" dirty="0"/>
+              <a:t>Everyday Examples (non software)</a:t>
+            </a:r>
+          </a:p>
+        </p:txBody>
+      </p:sp>
+      <p:sp>
+        <p:nvSpPr>
+          <p:cNvPr id="3" name="Content Placeholder 2">
+            <a:extLst>
+              <a:ext uri="{FF2B5EF4-FFF2-40B4-BE49-F238E27FC236}">
+                <a16:creationId xmlns:a16="http://schemas.microsoft.com/office/drawing/2014/main" id="{7E5B9D53-0A00-4C62-BB35-942E58FFD728}"/>
+              </a:ext>
+            </a:extLst>
+          </p:cNvPr>
+          <p:cNvSpPr>
+            <a:spLocks noGrp="1"/>
+          </p:cNvSpPr>
+          <p:nvPr>
+            <p:ph idx="1"/>
+          </p:nvPr>
+        </p:nvSpPr>
+        <p:spPr/>
+        <p:txBody>
+          <a:bodyPr>
+            <a:normAutofit/>
+          </a:bodyPr>
+          <a:lstStyle/>
+          <a:p>
+            <a:r>
+              <a:rPr lang="en-GB" dirty="0"/>
+              <a:t>Engineering revision control developed from formalized processes based on tracking revisions of early allowing returning to any earlier state of the design, for cases in which an engineering dead-end was reached.</a:t>
+            </a:r>
+          </a:p>
+          <a:p>
+            <a:endParaRPr lang="en-GB" dirty="0"/>
+          </a:p>
+          <a:p>
+            <a:r>
+              <a:rPr lang="en-GB" dirty="0"/>
+              <a:t>Version control is widespread in business and law. Indeed, "contract redline" and "legal blackline" are some of the earliest forms of revision control.</a:t>
+            </a:r>
+          </a:p>
+        </p:txBody>
+      </p:sp>
+    </p:spTree>
+    <p:extLst>
+      <p:ext uri="{BB962C8B-B14F-4D97-AF65-F5344CB8AC3E}">
+        <p14:creationId xmlns:p14="http://schemas.microsoft.com/office/powerpoint/2010/main" val="1682308366"/>
+      </p:ext>
+    </p:extLst>
+  </p:cSld>
+  <p:clrMapOvr>
+    <a:masterClrMapping/>
+  </p:clrMapOvr>
+</p:sld>
+</file>
+
+<file path=ppt/slides/slide30.xml><?xml version="1.0" encoding="utf-8"?>
 <p:sld xmlns:a="http://schemas.openxmlformats.org/drawingml/2006/main" xmlns:r="http://schemas.openxmlformats.org/officeDocument/2006/relationships" xmlns:p="http://schemas.openxmlformats.org/presentationml/2006/main">
   <p:cSld>
     <p:spTree>
@@ -6459,7 +7259,7 @@
 </p:sld>
 </file>
 
-<file path=ppt/slides/slide27.xml><?xml version="1.0" encoding="utf-8"?>
+<file path=ppt/slides/slide31.xml><?xml version="1.0" encoding="utf-8"?>
 <p:sld xmlns:a="http://schemas.openxmlformats.org/drawingml/2006/main" xmlns:r="http://schemas.openxmlformats.org/officeDocument/2006/relationships" xmlns:p="http://schemas.openxmlformats.org/presentationml/2006/main">
   <p:cSld>
     <p:spTree>
@@ -6572,7 +7372,7 @@
 </p:sld>
 </file>
 
-<file path=ppt/slides/slide28.xml><?xml version="1.0" encoding="utf-8"?>
+<file path=ppt/slides/slide32.xml><?xml version="1.0" encoding="utf-8"?>
 <p:sld xmlns:a="http://schemas.openxmlformats.org/drawingml/2006/main" xmlns:r="http://schemas.openxmlformats.org/officeDocument/2006/relationships" xmlns:p="http://schemas.openxmlformats.org/presentationml/2006/main">
   <p:cSld>
     <p:spTree>
@@ -6702,7 +7502,7 @@
 </p:sld>
 </file>
 
-<file path=ppt/slides/slide29.xml><?xml version="1.0" encoding="utf-8"?>
+<file path=ppt/slides/slide33.xml><?xml version="1.0" encoding="utf-8"?>
 <p:sld xmlns:a="http://schemas.openxmlformats.org/drawingml/2006/main" xmlns:r="http://schemas.openxmlformats.org/officeDocument/2006/relationships" xmlns:p="http://schemas.openxmlformats.org/presentationml/2006/main">
   <p:cSld>
     <p:spTree>
@@ -6866,149 +7666,7 @@
 </p:sld>
 </file>
 
-<file path=ppt/slides/slide3.xml><?xml version="1.0" encoding="utf-8"?>
-<p:sld xmlns:a="http://schemas.openxmlformats.org/drawingml/2006/main" xmlns:r="http://schemas.openxmlformats.org/officeDocument/2006/relationships" xmlns:p="http://schemas.openxmlformats.org/presentationml/2006/main">
-  <p:cSld>
-    <p:spTree>
-      <p:nvGrpSpPr>
-        <p:cNvPr id="1" name=""/>
-        <p:cNvGrpSpPr/>
-        <p:nvPr/>
-      </p:nvGrpSpPr>
-      <p:grpSpPr>
-        <a:xfrm>
-          <a:off x="0" y="0"/>
-          <a:ext cx="0" cy="0"/>
-          <a:chOff x="0" y="0"/>
-          <a:chExt cx="0" cy="0"/>
-        </a:xfrm>
-      </p:grpSpPr>
-      <p:sp>
-        <p:nvSpPr>
-          <p:cNvPr id="2" name="Title 1">
-            <a:extLst>
-              <a:ext uri="{FF2B5EF4-FFF2-40B4-BE49-F238E27FC236}">
-                <a16:creationId xmlns:a16="http://schemas.microsoft.com/office/drawing/2014/main" id="{740A911E-6BDC-4E52-AB0F-7D2DCA233C16}"/>
-              </a:ext>
-            </a:extLst>
-          </p:cNvPr>
-          <p:cNvSpPr>
-            <a:spLocks noGrp="1"/>
-          </p:cNvSpPr>
-          <p:nvPr>
-            <p:ph type="title"/>
-          </p:nvPr>
-        </p:nvSpPr>
-        <p:spPr/>
-        <p:txBody>
-          <a:bodyPr/>
-          <a:lstStyle/>
-          <a:p>
-            <a:r>
-              <a:rPr lang="en-GB" dirty="0"/>
-              <a:t>Examples from history (non software)</a:t>
-            </a:r>
-          </a:p>
-        </p:txBody>
-      </p:sp>
-      <p:sp>
-        <p:nvSpPr>
-          <p:cNvPr id="3" name="Content Placeholder 2">
-            <a:extLst>
-              <a:ext uri="{FF2B5EF4-FFF2-40B4-BE49-F238E27FC236}">
-                <a16:creationId xmlns:a16="http://schemas.microsoft.com/office/drawing/2014/main" id="{7E5B9D53-0A00-4C62-BB35-942E58FFD728}"/>
-              </a:ext>
-            </a:extLst>
-          </p:cNvPr>
-          <p:cNvSpPr>
-            <a:spLocks noGrp="1"/>
-          </p:cNvSpPr>
-          <p:nvPr>
-            <p:ph idx="1"/>
-          </p:nvPr>
-        </p:nvSpPr>
-        <p:spPr/>
-        <p:txBody>
-          <a:bodyPr>
-            <a:normAutofit fontScale="92500" lnSpcReduction="20000"/>
-          </a:bodyPr>
-          <a:lstStyle/>
-          <a:p>
-            <a:r>
-              <a:rPr lang="en-GB" dirty="0"/>
-              <a:t>Engineering revision control developed from formalized processes based on tracking revisions of early blueprints or </a:t>
-            </a:r>
-            <a:r>
-              <a:rPr lang="en-GB" dirty="0">
-                <a:hlinkClick r:id="rId2" tooltip="Whiteprint"/>
-              </a:rPr>
-              <a:t>bluelines</a:t>
-            </a:r>
-            <a:r>
-              <a:rPr lang="en-GB" dirty="0"/>
-              <a:t>. This system of control implicitly allowed returning to any earlier state of the design, for cases in which an engineering dead-end was reached in the development of the design. A revision table was used to keep track of the changes made. Additionally, the modified areas of the drawing were highlighted using revision clouds.</a:t>
-            </a:r>
-          </a:p>
-          <a:p>
-            <a:r>
-              <a:rPr lang="en-GB" dirty="0"/>
-              <a:t>Version control is widespread in business and law. Indeed, "contract redline" and "legal blackline" are some of the earliest forms of revision control,</a:t>
-            </a:r>
-            <a:r>
-              <a:rPr lang="en-GB" baseline="30000" dirty="0">
-                <a:hlinkClick r:id="rId3"/>
-              </a:rPr>
-              <a:t>[4]</a:t>
-            </a:r>
-            <a:r>
-              <a:rPr lang="en-GB" dirty="0"/>
-              <a:t> and are still employed in business and law with varying degrees of sophistication. The most sophisticated techniques are beginning to be used for the electronic tracking of changes to </a:t>
-            </a:r>
-            <a:r>
-              <a:rPr lang="en-GB" dirty="0">
-                <a:hlinkClick r:id="rId4" tooltip="CAD file (page does not exist)"/>
-              </a:rPr>
-              <a:t>CAD files</a:t>
-            </a:r>
-            <a:r>
-              <a:rPr lang="en-GB" dirty="0"/>
-              <a:t> (see </a:t>
-            </a:r>
-            <a:r>
-              <a:rPr lang="en-GB" dirty="0">
-                <a:hlinkClick r:id="rId5" tooltip="Product data management"/>
-              </a:rPr>
-              <a:t>product data management</a:t>
-            </a:r>
-            <a:r>
-              <a:rPr lang="en-GB" dirty="0"/>
-              <a:t>), supplanting the "manual" electronic implementation of traditional revision control.</a:t>
-            </a:r>
-            <a:r>
-              <a:rPr lang="en-GB" baseline="30000" dirty="0"/>
-              <a:t>[</a:t>
-            </a:r>
-            <a:endParaRPr lang="en-GB" dirty="0"/>
-          </a:p>
-          <a:p>
-            <a:endParaRPr lang="en-GB" dirty="0"/>
-          </a:p>
-        </p:txBody>
-      </p:sp>
-    </p:spTree>
-    <p:extLst>
-      <p:ext uri="{BB962C8B-B14F-4D97-AF65-F5344CB8AC3E}">
-        <p14:creationId xmlns:p14="http://schemas.microsoft.com/office/powerpoint/2010/main" val="1682308366"/>
-      </p:ext>
-    </p:extLst>
-  </p:cSld>
-  <p:clrMapOvr>
-    <a:masterClrMapping/>
-  </p:clrMapOvr>
-</p:sld>
-</file>
-
-<file path=ppt/slides/slide30.xml><?xml version="1.0" encoding="utf-8"?>
+<file path=ppt/slides/slide34.xml><?xml version="1.0" encoding="utf-8"?>
 <p:sld xmlns:a="http://schemas.openxmlformats.org/drawingml/2006/main" xmlns:r="http://schemas.openxmlformats.org/officeDocument/2006/relationships" xmlns:p="http://schemas.openxmlformats.org/presentationml/2006/main">
   <p:cSld>
     <p:spTree>
@@ -7145,7 +7803,7 @@
 </p:sld>
 </file>
 
-<file path=ppt/slides/slide31.xml><?xml version="1.0" encoding="utf-8"?>
+<file path=ppt/slides/slide35.xml><?xml version="1.0" encoding="utf-8"?>
 <p:sld xmlns:a="http://schemas.openxmlformats.org/drawingml/2006/main" xmlns:r="http://schemas.openxmlformats.org/officeDocument/2006/relationships" xmlns:p="http://schemas.openxmlformats.org/presentationml/2006/main">
   <p:cSld>
     <p:spTree>
@@ -7282,7 +7940,7 @@
 </p:sld>
 </file>
 
-<file path=ppt/slides/slide32.xml><?xml version="1.0" encoding="utf-8"?>
+<file path=ppt/slides/slide36.xml><?xml version="1.0" encoding="utf-8"?>
 <p:sld xmlns:a="http://schemas.openxmlformats.org/drawingml/2006/main" xmlns:r="http://schemas.openxmlformats.org/officeDocument/2006/relationships" xmlns:p="http://schemas.openxmlformats.org/presentationml/2006/main">
   <p:cSld>
     <p:spTree>
@@ -7370,7 +8028,7 @@
 </p:sld>
 </file>
 
-<file path=ppt/slides/slide33.xml><?xml version="1.0" encoding="utf-8"?>
+<file path=ppt/slides/slide37.xml><?xml version="1.0" encoding="utf-8"?>
 <p:sld xmlns:a="http://schemas.openxmlformats.org/drawingml/2006/main" xmlns:r="http://schemas.openxmlformats.org/officeDocument/2006/relationships" xmlns:p="http://schemas.openxmlformats.org/presentationml/2006/main">
   <p:cSld>
     <p:spTree>
@@ -7538,7 +8196,7 @@
 </p:sld>
 </file>
 
-<file path=ppt/slides/slide34.xml><?xml version="1.0" encoding="utf-8"?>
+<file path=ppt/slides/slide38.xml><?xml version="1.0" encoding="utf-8"?>
 <p:sld xmlns:a="http://schemas.openxmlformats.org/drawingml/2006/main" xmlns:r="http://schemas.openxmlformats.org/officeDocument/2006/relationships" xmlns:p="http://schemas.openxmlformats.org/presentationml/2006/main">
   <p:cSld>
     <p:spTree>
@@ -7662,7 +8320,7 @@
 </p:sld>
 </file>
 
-<file path=ppt/slides/slide35.xml><?xml version="1.0" encoding="utf-8"?>
+<file path=ppt/slides/slide39.xml><?xml version="1.0" encoding="utf-8"?>
 <p:sld xmlns:a="http://schemas.openxmlformats.org/drawingml/2006/main" xmlns:r="http://schemas.openxmlformats.org/officeDocument/2006/relationships" xmlns:p="http://schemas.openxmlformats.org/presentationml/2006/main">
   <p:cSld>
     <p:spTree>
@@ -7766,7 +8424,107 @@
 </p:sld>
 </file>
 
-<file path=ppt/slides/slide36.xml><?xml version="1.0" encoding="utf-8"?>
+<file path=ppt/slides/slide4.xml><?xml version="1.0" encoding="utf-8"?>
+<p:sld xmlns:a="http://schemas.openxmlformats.org/drawingml/2006/main" xmlns:r="http://schemas.openxmlformats.org/officeDocument/2006/relationships" xmlns:p="http://schemas.openxmlformats.org/presentationml/2006/main">
+  <p:cSld>
+    <p:spTree>
+      <p:nvGrpSpPr>
+        <p:cNvPr id="1" name=""/>
+        <p:cNvGrpSpPr/>
+        <p:nvPr/>
+      </p:nvGrpSpPr>
+      <p:grpSpPr>
+        <a:xfrm>
+          <a:off x="0" y="0"/>
+          <a:ext cx="0" cy="0"/>
+          <a:chOff x="0" y="0"/>
+          <a:chExt cx="0" cy="0"/>
+        </a:xfrm>
+      </p:grpSpPr>
+      <p:sp>
+        <p:nvSpPr>
+          <p:cNvPr id="2" name="Title 1">
+            <a:extLst>
+              <a:ext uri="{FF2B5EF4-FFF2-40B4-BE49-F238E27FC236}">
+                <a16:creationId xmlns:a16="http://schemas.microsoft.com/office/drawing/2014/main" id="{D96AAD69-7C2C-41BA-8308-140B6FE63D9A}"/>
+              </a:ext>
+            </a:extLst>
+          </p:cNvPr>
+          <p:cNvSpPr>
+            <a:spLocks noGrp="1"/>
+          </p:cNvSpPr>
+          <p:nvPr>
+            <p:ph type="title"/>
+          </p:nvPr>
+        </p:nvSpPr>
+        <p:spPr/>
+        <p:txBody>
+          <a:bodyPr/>
+          <a:lstStyle/>
+          <a:p>
+            <a:r>
+              <a:rPr lang="en-GB" dirty="0"/>
+              <a:t>What problem does it solve for software?</a:t>
+            </a:r>
+          </a:p>
+        </p:txBody>
+      </p:sp>
+      <p:sp>
+        <p:nvSpPr>
+          <p:cNvPr id="3" name="Content Placeholder 2">
+            <a:extLst>
+              <a:ext uri="{FF2B5EF4-FFF2-40B4-BE49-F238E27FC236}">
+                <a16:creationId xmlns:a16="http://schemas.microsoft.com/office/drawing/2014/main" id="{4FAB38A1-92EB-48D7-96BF-62407268F7D6}"/>
+              </a:ext>
+            </a:extLst>
+          </p:cNvPr>
+          <p:cNvSpPr>
+            <a:spLocks noGrp="1"/>
+          </p:cNvSpPr>
+          <p:nvPr>
+            <p:ph idx="1"/>
+          </p:nvPr>
+        </p:nvSpPr>
+        <p:spPr/>
+        <p:txBody>
+          <a:bodyPr>
+            <a:normAutofit/>
+          </a:bodyPr>
+          <a:lstStyle/>
+          <a:p>
+            <a:r>
+              <a:rPr lang="en-GB" dirty="0"/>
+              <a:t>It’s a broad topic that can solve several problems depending on application, but for most cases today it solves the following problem:</a:t>
+            </a:r>
+          </a:p>
+          <a:p>
+            <a:pPr marL="0" indent="0">
+              <a:buNone/>
+            </a:pPr>
+            <a:endParaRPr lang="en-GB" dirty="0"/>
+          </a:p>
+          <a:p>
+            <a:pPr marL="0" indent="0">
+              <a:buNone/>
+            </a:pPr>
+            <a:endParaRPr lang="en-GB" dirty="0"/>
+          </a:p>
+        </p:txBody>
+      </p:sp>
+    </p:spTree>
+    <p:extLst>
+      <p:ext uri="{BB962C8B-B14F-4D97-AF65-F5344CB8AC3E}">
+        <p14:creationId xmlns:p14="http://schemas.microsoft.com/office/powerpoint/2010/main" val="89128890"/>
+      </p:ext>
+    </p:extLst>
+  </p:cSld>
+  <p:clrMapOvr>
+    <a:masterClrMapping/>
+  </p:clrMapOvr>
+</p:sld>
+</file>
+
+<file path=ppt/slides/slide40.xml><?xml version="1.0" encoding="utf-8"?>
 <p:sld xmlns:a="http://schemas.openxmlformats.org/drawingml/2006/main" xmlns:r="http://schemas.openxmlformats.org/officeDocument/2006/relationships" xmlns:p="http://schemas.openxmlformats.org/presentationml/2006/main">
   <p:cSld>
     <p:spTree>
@@ -7921,7 +8679,7 @@
 </p:sld>
 </file>
 
-<file path=ppt/slides/slide37.xml><?xml version="1.0" encoding="utf-8"?>
+<file path=ppt/slides/slide41.xml><?xml version="1.0" encoding="utf-8"?>
 <p:sld xmlns:a="http://schemas.openxmlformats.org/drawingml/2006/main" xmlns:r="http://schemas.openxmlformats.org/officeDocument/2006/relationships" xmlns:p="http://schemas.openxmlformats.org/presentationml/2006/main">
   <p:cSld>
     <p:spTree>
@@ -8163,7 +8921,7 @@
 </p:sld>
 </file>
 
-<file path=ppt/slides/slide38.xml><?xml version="1.0" encoding="utf-8"?>
+<file path=ppt/slides/slide42.xml><?xml version="1.0" encoding="utf-8"?>
 <p:sld xmlns:a="http://schemas.openxmlformats.org/drawingml/2006/main" xmlns:r="http://schemas.openxmlformats.org/officeDocument/2006/relationships" xmlns:p="http://schemas.openxmlformats.org/presentationml/2006/main">
   <p:cSld>
     <p:spTree>
@@ -8273,7 +9031,7 @@
 </p:sld>
 </file>
 
-<file path=ppt/slides/slide39.xml><?xml version="1.0" encoding="utf-8"?>
+<file path=ppt/slides/slide43.xml><?xml version="1.0" encoding="utf-8"?>
 <p:sld xmlns:a="http://schemas.openxmlformats.org/drawingml/2006/main" xmlns:r="http://schemas.openxmlformats.org/officeDocument/2006/relationships" xmlns:p="http://schemas.openxmlformats.org/presentationml/2006/main">
   <p:cSld>
     <p:spTree>
@@ -8384,145 +9142,7 @@
 </p:sld>
 </file>
 
-<file path=ppt/slides/slide4.xml><?xml version="1.0" encoding="utf-8"?>
-<p:sld xmlns:a="http://schemas.openxmlformats.org/drawingml/2006/main" xmlns:r="http://schemas.openxmlformats.org/officeDocument/2006/relationships" xmlns:p="http://schemas.openxmlformats.org/presentationml/2006/main">
-  <p:cSld>
-    <p:spTree>
-      <p:nvGrpSpPr>
-        <p:cNvPr id="1" name=""/>
-        <p:cNvGrpSpPr/>
-        <p:nvPr/>
-      </p:nvGrpSpPr>
-      <p:grpSpPr>
-        <a:xfrm>
-          <a:off x="0" y="0"/>
-          <a:ext cx="0" cy="0"/>
-          <a:chOff x="0" y="0"/>
-          <a:chExt cx="0" cy="0"/>
-        </a:xfrm>
-      </p:grpSpPr>
-      <p:sp>
-        <p:nvSpPr>
-          <p:cNvPr id="2" name="Title 1">
-            <a:extLst>
-              <a:ext uri="{FF2B5EF4-FFF2-40B4-BE49-F238E27FC236}">
-                <a16:creationId xmlns:a16="http://schemas.microsoft.com/office/drawing/2014/main" id="{D96AAD69-7C2C-41BA-8308-140B6FE63D9A}"/>
-              </a:ext>
-            </a:extLst>
-          </p:cNvPr>
-          <p:cNvSpPr>
-            <a:spLocks noGrp="1"/>
-          </p:cNvSpPr>
-          <p:nvPr>
-            <p:ph type="title"/>
-          </p:nvPr>
-        </p:nvSpPr>
-        <p:spPr/>
-        <p:txBody>
-          <a:bodyPr/>
-          <a:lstStyle/>
-          <a:p>
-            <a:r>
-              <a:rPr lang="en-GB" dirty="0"/>
-              <a:t>What problem does it solve for software?</a:t>
-            </a:r>
-          </a:p>
-        </p:txBody>
-      </p:sp>
-      <p:sp>
-        <p:nvSpPr>
-          <p:cNvPr id="3" name="Content Placeholder 2">
-            <a:extLst>
-              <a:ext uri="{FF2B5EF4-FFF2-40B4-BE49-F238E27FC236}">
-                <a16:creationId xmlns:a16="http://schemas.microsoft.com/office/drawing/2014/main" id="{4FAB38A1-92EB-48D7-96BF-62407268F7D6}"/>
-              </a:ext>
-            </a:extLst>
-          </p:cNvPr>
-          <p:cNvSpPr>
-            <a:spLocks noGrp="1"/>
-          </p:cNvSpPr>
-          <p:nvPr>
-            <p:ph idx="1"/>
-          </p:nvPr>
-        </p:nvSpPr>
-        <p:spPr/>
-        <p:txBody>
-          <a:bodyPr/>
-          <a:lstStyle/>
-          <a:p>
-            <a:r>
-              <a:rPr lang="en-GB" dirty="0"/>
-              <a:t>Allows multiple developers to collaborate on the same code base by</a:t>
-            </a:r>
-          </a:p>
-          <a:p>
-            <a:pPr lvl="1"/>
-            <a:r>
-              <a:rPr lang="en-GB" dirty="0"/>
-              <a:t>Providing a mechanism to store and retrieve the code and changes</a:t>
-            </a:r>
-          </a:p>
-          <a:p>
-            <a:pPr lvl="1"/>
-            <a:r>
-              <a:rPr lang="en-GB" dirty="0"/>
-              <a:t>Providing a mechanism to deal with changes to the same files</a:t>
-            </a:r>
-          </a:p>
-          <a:p>
-            <a:pPr lvl="1"/>
-            <a:r>
-              <a:rPr lang="en-GB" dirty="0"/>
-              <a:t>Providing a readable history of how the code has changed</a:t>
-            </a:r>
-          </a:p>
-          <a:p>
-            <a:pPr lvl="1"/>
-            <a:r>
-              <a:rPr lang="en-GB" dirty="0"/>
-              <a:t>Providing a way to return to a previous state</a:t>
-            </a:r>
-          </a:p>
-          <a:p>
-            <a:pPr marL="457200" lvl="1" indent="0">
-              <a:buNone/>
-            </a:pPr>
-            <a:endParaRPr lang="en-GB" dirty="0"/>
-          </a:p>
-          <a:p>
-            <a:r>
-              <a:rPr lang="en-GB" dirty="0"/>
-              <a:t>Different products tackle these in differing ways.</a:t>
-            </a:r>
-          </a:p>
-          <a:p>
-            <a:pPr marL="0" indent="0">
-              <a:buNone/>
-            </a:pPr>
-            <a:endParaRPr lang="en-GB" dirty="0"/>
-          </a:p>
-          <a:p>
-            <a:pPr marL="0" indent="0">
-              <a:buNone/>
-            </a:pPr>
-            <a:endParaRPr lang="en-GB" dirty="0"/>
-          </a:p>
-        </p:txBody>
-      </p:sp>
-    </p:spTree>
-    <p:extLst>
-      <p:ext uri="{BB962C8B-B14F-4D97-AF65-F5344CB8AC3E}">
-        <p14:creationId xmlns:p14="http://schemas.microsoft.com/office/powerpoint/2010/main" val="89128890"/>
-      </p:ext>
-    </p:extLst>
-  </p:cSld>
-  <p:clrMapOvr>
-    <a:masterClrMapping/>
-  </p:clrMapOvr>
-</p:sld>
-</file>
-
-<file path=ppt/slides/slide40.xml><?xml version="1.0" encoding="utf-8"?>
+<file path=ppt/slides/slide44.xml><?xml version="1.0" encoding="utf-8"?>
 <p:sld xmlns:a="http://schemas.openxmlformats.org/drawingml/2006/main" xmlns:r="http://schemas.openxmlformats.org/officeDocument/2006/relationships" xmlns:p="http://schemas.openxmlformats.org/presentationml/2006/main">
   <p:cSld>
     <p:spTree>
@@ -8582,7 +9202,7 @@
 </p:sld>
 </file>
 
-<file path=ppt/slides/slide41.xml><?xml version="1.0" encoding="utf-8"?>
+<file path=ppt/slides/slide45.xml><?xml version="1.0" encoding="utf-8"?>
 <p:sld xmlns:a="http://schemas.openxmlformats.org/drawingml/2006/main" xmlns:r="http://schemas.openxmlformats.org/officeDocument/2006/relationships" xmlns:p="http://schemas.openxmlformats.org/presentationml/2006/main">
   <p:cSld>
     <p:spTree>
@@ -8642,7 +9262,7 @@
 </p:sld>
 </file>
 
-<file path=ppt/slides/slide42.xml><?xml version="1.0" encoding="utf-8"?>
+<file path=ppt/slides/slide46.xml><?xml version="1.0" encoding="utf-8"?>
 <p:sld xmlns:a="http://schemas.openxmlformats.org/drawingml/2006/main" xmlns:r="http://schemas.openxmlformats.org/officeDocument/2006/relationships" xmlns:p="http://schemas.openxmlformats.org/presentationml/2006/main">
   <p:cSld>
     <p:spTree>
@@ -8802,7 +9422,7 @@
 </p:sld>
 </file>
 
-<file path=ppt/slides/slide43.xml><?xml version="1.0" encoding="utf-8"?>
+<file path=ppt/slides/slide47.xml><?xml version="1.0" encoding="utf-8"?>
 <p:sld xmlns:a="http://schemas.openxmlformats.org/drawingml/2006/main" xmlns:r="http://schemas.openxmlformats.org/officeDocument/2006/relationships" xmlns:p="http://schemas.openxmlformats.org/presentationml/2006/main">
   <p:cSld>
     <p:spTree>
@@ -8900,7 +9520,7 @@
 </p:sld>
 </file>
 
-<file path=ppt/slides/slide44.xml><?xml version="1.0" encoding="utf-8"?>
+<file path=ppt/slides/slide48.xml><?xml version="1.0" encoding="utf-8"?>
 <p:sld xmlns:a="http://schemas.openxmlformats.org/drawingml/2006/main" xmlns:r="http://schemas.openxmlformats.org/officeDocument/2006/relationships" xmlns:p="http://schemas.openxmlformats.org/presentationml/2006/main">
   <p:cSld>
     <p:spTree>
@@ -9027,7 +9647,7 @@
 </p:sld>
 </file>
 
-<file path=ppt/slides/slide45.xml><?xml version="1.0" encoding="utf-8"?>
+<file path=ppt/slides/slide49.xml><?xml version="1.0" encoding="utf-8"?>
 <p:sld xmlns:a="http://schemas.openxmlformats.org/drawingml/2006/main" xmlns:r="http://schemas.openxmlformats.org/officeDocument/2006/relationships" xmlns:p="http://schemas.openxmlformats.org/presentationml/2006/main">
   <p:cSld>
     <p:spTree>
@@ -9218,7 +9838,7 @@
           <p:cNvPr id="2" name="Title 1">
             <a:extLst>
               <a:ext uri="{FF2B5EF4-FFF2-40B4-BE49-F238E27FC236}">
-                <a16:creationId xmlns:a16="http://schemas.microsoft.com/office/drawing/2014/main" id="{025010A4-964D-42F3-8CC9-921F3D99E2E4}"/>
+                <a16:creationId xmlns:a16="http://schemas.microsoft.com/office/drawing/2014/main" id="{D96AAD69-7C2C-41BA-8308-140B6FE63D9A}"/>
               </a:ext>
             </a:extLst>
           </p:cNvPr>
@@ -9236,7 +9856,7 @@
           <a:p>
             <a:r>
               <a:rPr lang="en-GB" dirty="0"/>
-              <a:t>Quick History</a:t>
+              <a:t>What problem does it solve for software?</a:t>
             </a:r>
           </a:p>
         </p:txBody>
@@ -9246,7 +9866,7 @@
           <p:cNvPr id="3" name="Content Placeholder 2">
             <a:extLst>
               <a:ext uri="{FF2B5EF4-FFF2-40B4-BE49-F238E27FC236}">
-                <a16:creationId xmlns:a16="http://schemas.microsoft.com/office/drawing/2014/main" id="{655D2ABC-EF5A-4733-861F-D671E64A2A76}"/>
+                <a16:creationId xmlns:a16="http://schemas.microsoft.com/office/drawing/2014/main" id="{4FAB38A1-92EB-48D7-96BF-62407268F7D6}"/>
               </a:ext>
             </a:extLst>
           </p:cNvPr>
@@ -9260,115 +9880,72 @@
         <p:spPr/>
         <p:txBody>
           <a:bodyPr>
-            <a:normAutofit fontScale="92500" lnSpcReduction="20000"/>
+            <a:normAutofit/>
           </a:bodyPr>
           <a:lstStyle/>
           <a:p>
             <a:r>
-              <a:rPr lang="en-GB" b="1" dirty="0"/>
-              <a:t>1st Gen - </a:t>
-            </a:r>
-            <a:r>
-              <a:rPr lang="en-GB" dirty="0"/>
-              <a:t>SCCS (1972) RCS (1982)</a:t>
-            </a:r>
-          </a:p>
-          <a:p>
-            <a:r>
-              <a:rPr lang="en-GB" dirty="0"/>
-              <a:t>Designed to solve a specific set of problems</a:t>
+              <a:rPr lang="en-GB" dirty="0"/>
+              <a:t>Allows multiple developers to collaborate on the same code base by</a:t>
             </a:r>
           </a:p>
           <a:p>
             <a:pPr lvl="1"/>
             <a:r>
               <a:rPr lang="en-GB" dirty="0"/>
-              <a:t>Source code takes up too much space because it is repeated in every version.</a:t>
+              <a:t>Providing a mechanism to centrally store code </a:t>
             </a:r>
           </a:p>
           <a:p>
             <a:pPr lvl="1"/>
             <a:r>
               <a:rPr lang="en-GB" dirty="0"/>
-              <a:t>Passing optimization from one version to other versions is difficult.</a:t>
+              <a:t>Retrieve and modify the code</a:t>
             </a:r>
           </a:p>
           <a:p>
             <a:pPr lvl="1"/>
             <a:r>
               <a:rPr lang="en-GB" dirty="0"/>
-              <a:t>It is hard to acquire information about when and where changes occurred.</a:t>
+              <a:t>Providing a readable audit of how the code has changed</a:t>
             </a:r>
           </a:p>
           <a:p>
             <a:pPr lvl="1"/>
             <a:r>
               <a:rPr lang="en-GB" dirty="0"/>
-              <a:t>Finding the exact version which the </a:t>
-            </a:r>
-            <a:r>
-              <a:rPr lang="en-GB" dirty="0">
-                <a:hlinkClick r:id="rId2" tooltip="Client–server model"/>
-              </a:rPr>
-              <a:t>client</a:t>
-            </a:r>
-            <a:r>
-              <a:rPr lang="en-GB" dirty="0"/>
-              <a:t> has problems with is difficult.</a:t>
-            </a:r>
-            <a:endParaRPr lang="en-GB" b="1" dirty="0"/>
-          </a:p>
-          <a:p>
-            <a:r>
-              <a:rPr lang="en-GB" dirty="0"/>
-              <a:t>Context </a:t>
+              <a:t>Providing a mechanism to deal with multiple parties changing the same files</a:t>
             </a:r>
           </a:p>
           <a:p>
             <a:pPr lvl="1"/>
             <a:r>
               <a:rPr lang="en-GB" dirty="0"/>
-              <a:t>Storage was expensive </a:t>
-            </a:r>
-          </a:p>
-          <a:p>
-            <a:pPr lvl="1"/>
-            <a:r>
-              <a:rPr lang="en-GB" dirty="0"/>
-              <a:t>Software gets packaged and shipped to clients</a:t>
-            </a:r>
-          </a:p>
-          <a:p>
-            <a:pPr lvl="1"/>
-            <a:r>
-              <a:rPr lang="en-GB" dirty="0"/>
-              <a:t>Multiple versions are supported at the same time</a:t>
-            </a:r>
-          </a:p>
-          <a:p>
-            <a:r>
-              <a:rPr lang="en-GB" dirty="0"/>
-              <a:t>Lock based -You lock a file while you are working on it</a:t>
-            </a:r>
-          </a:p>
-          <a:p>
-            <a:r>
-              <a:rPr lang="en-GB" dirty="0"/>
-              <a:t>Deltas – stores files in a space efficient manner by only storing the parts that have changed using a method called </a:t>
-            </a:r>
-            <a:r>
-              <a:rPr lang="en-GB" b="1" dirty="0"/>
-              <a:t>Interleaved deltas</a:t>
-            </a:r>
-            <a:r>
-              <a:rPr lang="en-GB" dirty="0"/>
-              <a:t> </a:t>
-            </a:r>
-          </a:p>
-          <a:p>
+              <a:t>Providing a way to return to a previous state</a:t>
+            </a:r>
+          </a:p>
+          <a:p>
+            <a:pPr marL="457200" lvl="1" indent="0">
+              <a:buNone/>
+            </a:pPr>
             <a:endParaRPr lang="en-GB" dirty="0"/>
           </a:p>
           <a:p>
+            <a:r>
+              <a:rPr lang="en-GB" dirty="0"/>
+              <a:t>Different products tackle these in differing ways.</a:t>
+            </a:r>
+          </a:p>
+          <a:p>
+            <a:pPr marL="0" indent="0">
+              <a:buNone/>
+            </a:pPr>
+            <a:endParaRPr lang="en-GB" dirty="0"/>
+          </a:p>
+          <a:p>
+            <a:pPr marL="0" indent="0">
+              <a:buNone/>
+            </a:pPr>
             <a:endParaRPr lang="en-GB" dirty="0"/>
           </a:p>
         </p:txBody>
@@ -9376,7 +9953,7 @@
     </p:spTree>
     <p:extLst>
       <p:ext uri="{BB962C8B-B14F-4D97-AF65-F5344CB8AC3E}">
-        <p14:creationId xmlns:p14="http://schemas.microsoft.com/office/powerpoint/2010/main" val="801075187"/>
+        <p14:creationId xmlns:p14="http://schemas.microsoft.com/office/powerpoint/2010/main" val="2329199084"/>
       </p:ext>
     </p:extLst>
   </p:cSld>
@@ -9408,7 +9985,7 @@
           <p:cNvPr id="2" name="Title 1">
             <a:extLst>
               <a:ext uri="{FF2B5EF4-FFF2-40B4-BE49-F238E27FC236}">
-                <a16:creationId xmlns:a16="http://schemas.microsoft.com/office/drawing/2014/main" id="{D61586A8-0824-49D1-B516-1BD9CF6673A1}"/>
+                <a16:creationId xmlns:a16="http://schemas.microsoft.com/office/drawing/2014/main" id="{025010A4-964D-42F3-8CC9-921F3D99E2E4}"/>
               </a:ext>
             </a:extLst>
           </p:cNvPr>
@@ -9426,7 +10003,7 @@
           <a:p>
             <a:r>
               <a:rPr lang="en-GB" dirty="0"/>
-              <a:t>More History</a:t>
+              <a:t>Quick History of Source Control Software</a:t>
             </a:r>
           </a:p>
         </p:txBody>
@@ -9436,7 +10013,7 @@
           <p:cNvPr id="3" name="Content Placeholder 2">
             <a:extLst>
               <a:ext uri="{FF2B5EF4-FFF2-40B4-BE49-F238E27FC236}">
-                <a16:creationId xmlns:a16="http://schemas.microsoft.com/office/drawing/2014/main" id="{5615D9EE-CD05-4BF1-A655-66971E41C0FB}"/>
+                <a16:creationId xmlns:a16="http://schemas.microsoft.com/office/drawing/2014/main" id="{655D2ABC-EF5A-4733-861F-D671E64A2A76}"/>
               </a:ext>
             </a:extLst>
           </p:cNvPr>
@@ -9450,99 +10027,44 @@
         <p:spPr/>
         <p:txBody>
           <a:bodyPr>
-            <a:normAutofit fontScale="40000" lnSpcReduction="20000"/>
+            <a:normAutofit/>
           </a:bodyPr>
           <a:lstStyle/>
           <a:p>
             <a:r>
-              <a:rPr lang="en-GB" b="1" dirty="0"/>
-              <a:t>2nd Gen - Centralized Source Control</a:t>
-            </a:r>
-          </a:p>
-          <a:p>
-            <a:r>
-              <a:rPr lang="en-GB" dirty="0"/>
-              <a:t>CVS uses a client–server architecture: a server stores the current version(s) of a project and its history, and clients connect to the server in order to "check out" a complete copy of the project, work on this copy and then later "check in" their changes.</a:t>
-            </a:r>
-          </a:p>
-          <a:p>
-            <a:r>
-              <a:rPr lang="en-GB" dirty="0"/>
-              <a:t>Several developers may work on the same project concurrently, each one editing files within their own "working copy" of the project, and sending (or checking in) their modifications to the server.</a:t>
-            </a:r>
-          </a:p>
-          <a:p>
-            <a:r>
-              <a:rPr lang="en-GB" dirty="0"/>
-              <a:t> To avoid conflicts, the server only accepts changes made to the most recent version of a file. Developers keep their working copy up-to-date by incorporating other people's changes on a regular basis. </a:t>
-            </a:r>
-          </a:p>
-          <a:p>
-            <a:r>
-              <a:rPr lang="en-GB" dirty="0"/>
-              <a:t>This task is mostly handled automatically by the CVS client, requiring manual intervention only when an edit conflict arises between a checked-in modification and the yet-unchecked local version of a file.</a:t>
-            </a:r>
-          </a:p>
-          <a:p>
-            <a:r>
-              <a:rPr lang="en-GB" dirty="0"/>
-              <a:t>If the check in operation succeeds, then the version numbers of all files involved automatically increment, and the CVS-server writes a user-supplied description line, the date and the author's name to its log files.</a:t>
-            </a:r>
-          </a:p>
-          <a:p>
-            <a:r>
-              <a:rPr lang="en-GB" dirty="0"/>
-              <a:t>Clients can also compare versions, request a complete history of changes, or check out a historical snapshot of the project as of a given date or as of a revision number.</a:t>
-            </a:r>
-          </a:p>
-          <a:p>
-            <a:r>
-              <a:rPr lang="en-GB" dirty="0"/>
-              <a:t>CVS servers can allow "anonymous read access", check-in of changes requires a personal account and password </a:t>
-            </a:r>
-          </a:p>
-          <a:p>
-            <a:r>
-              <a:rPr lang="en-GB" dirty="0"/>
-              <a:t>Clients use the "update" command to bring their local copies up-to-date with the newest version on the server. This eliminates the need for repeated downloading of the whole project.</a:t>
-            </a:r>
-          </a:p>
-          <a:p>
-            <a:r>
-              <a:rPr lang="en-GB" dirty="0"/>
-              <a:t>CVS can also maintain different "branches" of a project. For instance, a released version of the software project may form one branch, used for bug fixes, while a version under current development, with major changes and new features, can form a separate branch.</a:t>
-            </a:r>
-          </a:p>
-          <a:p>
-            <a:r>
-              <a:rPr lang="en-GB" dirty="0"/>
-              <a:t>CVS uses delta compression for efficient storage of different versions of the same file. This works well with large text files with few changes from one version to the next. This is usually the case for source code files. On the other hand, when CVS is told to store a file as binary, it will keep each individual version on the server. Storing files as binary is important in order to avoid corruption of binary files.</a:t>
-            </a:r>
-          </a:p>
-          <a:p>
-            <a:r>
-              <a:rPr lang="en-GB" b="1" dirty="0"/>
-              <a:t>CVS (1986), </a:t>
-            </a:r>
-          </a:p>
-          <a:p>
-            <a:r>
-              <a:rPr lang="en-GB" b="1" dirty="0"/>
-              <a:t>SVN (2000) </a:t>
-            </a:r>
-            <a:r>
-              <a:rPr lang="en-GB" dirty="0"/>
-              <a:t>CVS evolved</a:t>
-            </a:r>
-            <a:r>
-              <a:rPr lang="en-GB" b="1" dirty="0"/>
-              <a:t> </a:t>
-            </a:r>
-            <a:r>
-              <a:rPr lang="en-GB" dirty="0"/>
-              <a:t>with improvements</a:t>
-            </a:r>
-            <a:endParaRPr lang="en-GB" b="1" dirty="0"/>
+              <a:rPr lang="en-GB" dirty="0"/>
+              <a:t>In the beginning…</a:t>
+            </a:r>
+          </a:p>
+          <a:p>
+            <a:r>
+              <a:rPr lang="en-GB" dirty="0"/>
+              <a:t>Constraints and Conditions at that point in time</a:t>
+            </a:r>
+          </a:p>
+          <a:p>
+            <a:pPr lvl="1"/>
+            <a:r>
+              <a:rPr lang="en-GB" dirty="0"/>
+              <a:t>Storage was expensive </a:t>
+            </a:r>
+          </a:p>
+          <a:p>
+            <a:pPr lvl="1"/>
+            <a:r>
+              <a:rPr lang="en-GB" dirty="0"/>
+              <a:t>Software got distributed on floppy disks</a:t>
+            </a:r>
+          </a:p>
+          <a:p>
+            <a:pPr lvl="1"/>
+            <a:r>
+              <a:rPr lang="en-GB" dirty="0"/>
+              <a:t>Multiple versions are supported at the same time</a:t>
+            </a:r>
+          </a:p>
+          <a:p>
+            <a:endParaRPr lang="en-GB" dirty="0"/>
           </a:p>
           <a:p>
             <a:endParaRPr lang="en-GB" dirty="0"/>
@@ -9552,7 +10074,7 @@
     </p:spTree>
     <p:extLst>
       <p:ext uri="{BB962C8B-B14F-4D97-AF65-F5344CB8AC3E}">
-        <p14:creationId xmlns:p14="http://schemas.microsoft.com/office/powerpoint/2010/main" val="2824413385"/>
+        <p14:creationId xmlns:p14="http://schemas.microsoft.com/office/powerpoint/2010/main" val="801075187"/>
       </p:ext>
     </p:extLst>
   </p:cSld>
@@ -9584,7 +10106,7 @@
           <p:cNvPr id="2" name="Title 1">
             <a:extLst>
               <a:ext uri="{FF2B5EF4-FFF2-40B4-BE49-F238E27FC236}">
-                <a16:creationId xmlns:a16="http://schemas.microsoft.com/office/drawing/2014/main" id="{D6F3C245-80E0-4CF4-A9CE-479E3B053FDC}"/>
+                <a16:creationId xmlns:a16="http://schemas.microsoft.com/office/drawing/2014/main" id="{025010A4-964D-42F3-8CC9-921F3D99E2E4}"/>
               </a:ext>
             </a:extLst>
           </p:cNvPr>
@@ -9602,7 +10124,7 @@
           <a:p>
             <a:r>
               <a:rPr lang="en-GB" dirty="0"/>
-              <a:t>Branches?</a:t>
+              <a:t>Quick History of Source Control Software</a:t>
             </a:r>
           </a:p>
         </p:txBody>
@@ -9612,7 +10134,7 @@
           <p:cNvPr id="3" name="Content Placeholder 2">
             <a:extLst>
               <a:ext uri="{FF2B5EF4-FFF2-40B4-BE49-F238E27FC236}">
-                <a16:creationId xmlns:a16="http://schemas.microsoft.com/office/drawing/2014/main" id="{149D6315-CE32-4CA1-9567-67A85BE95C19}"/>
+                <a16:creationId xmlns:a16="http://schemas.microsoft.com/office/drawing/2014/main" id="{655D2ABC-EF5A-4733-861F-D671E64A2A76}"/>
               </a:ext>
             </a:extLst>
           </p:cNvPr>
@@ -9623,32 +10145,66 @@
             <p:ph idx="1"/>
           </p:nvPr>
         </p:nvSpPr>
-        <p:spPr>
-          <a:xfrm>
-            <a:off x="838200" y="1844479"/>
-            <a:ext cx="10515600" cy="4351338"/>
-          </a:xfrm>
-        </p:spPr>
-        <p:txBody>
-          <a:bodyPr/>
-          <a:lstStyle/>
-          <a:p>
-            <a:r>
-              <a:rPr lang="en-GB" dirty="0"/>
-              <a:t>Like as in a tree?</a:t>
-            </a:r>
-          </a:p>
-          <a:p>
-            <a:r>
-              <a:rPr lang="en-GB" dirty="0"/>
-              <a:t>Or more like graph theory</a:t>
-            </a:r>
-          </a:p>
-          <a:p>
-            <a:r>
-              <a:rPr lang="en-GB" dirty="0"/>
-              <a:t>Allows two (or more) parallel version of the files/software to exist at the same time </a:t>
-            </a:r>
+        <p:spPr/>
+        <p:txBody>
+          <a:bodyPr>
+            <a:normAutofit/>
+          </a:bodyPr>
+          <a:lstStyle/>
+          <a:p>
+            <a:r>
+              <a:rPr lang="en-GB" b="1" dirty="0"/>
+              <a:t>1st Gen - </a:t>
+            </a:r>
+            <a:r>
+              <a:rPr lang="en-GB" dirty="0"/>
+              <a:t>SCCS (1972) RCS (1982)</a:t>
+            </a:r>
+          </a:p>
+          <a:p>
+            <a:r>
+              <a:rPr lang="en-GB" dirty="0"/>
+              <a:t>Designed to solve a specific set of problems</a:t>
+            </a:r>
+          </a:p>
+          <a:p>
+            <a:pPr lvl="1"/>
+            <a:r>
+              <a:rPr lang="en-GB" dirty="0"/>
+              <a:t>Source code takes up too much space because it is repeated in every version.</a:t>
+            </a:r>
+          </a:p>
+          <a:p>
+            <a:pPr lvl="1"/>
+            <a:r>
+              <a:rPr lang="en-GB" dirty="0"/>
+              <a:t>Passing fixes from one version to other versions is difficult.</a:t>
+            </a:r>
+          </a:p>
+          <a:p>
+            <a:pPr lvl="1"/>
+            <a:r>
+              <a:rPr lang="en-GB" dirty="0"/>
+              <a:t>It is hard to acquire information about when and where changes occurred.</a:t>
+            </a:r>
+          </a:p>
+          <a:p>
+            <a:pPr lvl="1"/>
+            <a:r>
+              <a:rPr lang="en-GB" dirty="0"/>
+              <a:t>Finding the exact version which the </a:t>
+            </a:r>
+            <a:r>
+              <a:rPr lang="en-GB" dirty="0">
+                <a:hlinkClick r:id="rId2" tooltip="Client–server model"/>
+              </a:rPr>
+              <a:t>client</a:t>
+            </a:r>
+            <a:r>
+              <a:rPr lang="en-GB" dirty="0"/>
+              <a:t> has problems with is difficult.</a:t>
+            </a:r>
+            <a:endParaRPr lang="en-GB" b="1" dirty="0"/>
           </a:p>
           <a:p>
             <a:endParaRPr lang="en-GB" dirty="0"/>
@@ -9656,55 +10212,12 @@
           <a:p>
             <a:endParaRPr lang="en-GB" dirty="0"/>
           </a:p>
-          <a:p>
-            <a:endParaRPr lang="en-GB" dirty="0"/>
-          </a:p>
-          <a:p>
-            <a:r>
-              <a:rPr lang="en-GB" dirty="0"/>
-              <a:t>Usually changes need to be incorporated (merged) across branches</a:t>
-            </a:r>
-          </a:p>
-          <a:p>
-            <a:pPr lvl="1"/>
-            <a:endParaRPr lang="en-GB" dirty="0"/>
-          </a:p>
-        </p:txBody>
-      </p:sp>
-      <p:pic>
-        <p:nvPicPr>
-          <p:cNvPr id="8" name="Picture 7">
-            <a:extLst>
-              <a:ext uri="{FF2B5EF4-FFF2-40B4-BE49-F238E27FC236}">
-                <a16:creationId xmlns:a16="http://schemas.microsoft.com/office/drawing/2014/main" id="{EDCB9A8A-33E7-46EA-9D79-FF5C97C52207}"/>
-              </a:ext>
-            </a:extLst>
-          </p:cNvPr>
-          <p:cNvPicPr>
-            <a:picLocks noChangeAspect="1"/>
-          </p:cNvPicPr>
-          <p:nvPr/>
-        </p:nvPicPr>
-        <p:blipFill>
-          <a:blip r:embed="rId2"/>
-          <a:stretch>
-            <a:fillRect/>
-          </a:stretch>
-        </p:blipFill>
-        <p:spPr>
-          <a:xfrm>
-            <a:off x="8452236" y="3697357"/>
-            <a:ext cx="2118739" cy="1221656"/>
-          </a:xfrm>
-          <a:prstGeom prst="rect">
-            <a:avLst/>
-          </a:prstGeom>
-        </p:spPr>
-      </p:pic>
+        </p:txBody>
+      </p:sp>
     </p:spTree>
     <p:extLst>
       <p:ext uri="{BB962C8B-B14F-4D97-AF65-F5344CB8AC3E}">
-        <p14:creationId xmlns:p14="http://schemas.microsoft.com/office/powerpoint/2010/main" val="3699011617"/>
+        <p14:creationId xmlns:p14="http://schemas.microsoft.com/office/powerpoint/2010/main" val="1255588941"/>
       </p:ext>
     </p:extLst>
   </p:cSld>
@@ -9736,7 +10249,7 @@
           <p:cNvPr id="2" name="Title 1">
             <a:extLst>
               <a:ext uri="{FF2B5EF4-FFF2-40B4-BE49-F238E27FC236}">
-                <a16:creationId xmlns:a16="http://schemas.microsoft.com/office/drawing/2014/main" id="{D6F3C245-80E0-4CF4-A9CE-479E3B053FDC}"/>
+                <a16:creationId xmlns:a16="http://schemas.microsoft.com/office/drawing/2014/main" id="{025010A4-964D-42F3-8CC9-921F3D99E2E4}"/>
               </a:ext>
             </a:extLst>
           </p:cNvPr>
@@ -9754,7 +10267,7 @@
           <a:p>
             <a:r>
               <a:rPr lang="en-GB" dirty="0"/>
-              <a:t>Branches?</a:t>
+              <a:t>Quick History of Source Control Software</a:t>
             </a:r>
           </a:p>
         </p:txBody>
@@ -9764,7 +10277,7 @@
           <p:cNvPr id="3" name="Content Placeholder 2">
             <a:extLst>
               <a:ext uri="{FF2B5EF4-FFF2-40B4-BE49-F238E27FC236}">
-                <a16:creationId xmlns:a16="http://schemas.microsoft.com/office/drawing/2014/main" id="{149D6315-CE32-4CA1-9567-67A85BE95C19}"/>
+                <a16:creationId xmlns:a16="http://schemas.microsoft.com/office/drawing/2014/main" id="{655D2ABC-EF5A-4733-861F-D671E64A2A76}"/>
               </a:ext>
             </a:extLst>
           </p:cNvPr>
@@ -9775,194 +10288,52 @@
             <p:ph idx="1"/>
           </p:nvPr>
         </p:nvSpPr>
-        <p:spPr>
-          <a:xfrm>
-            <a:off x="838200" y="1844479"/>
-            <a:ext cx="10515600" cy="4351338"/>
-          </a:xfrm>
-        </p:spPr>
-        <p:txBody>
-          <a:bodyPr/>
-          <a:lstStyle/>
-          <a:p>
-            <a:r>
-              <a:rPr lang="en-GB" dirty="0"/>
-              <a:t>Many different approaches and strategies</a:t>
-            </a:r>
-          </a:p>
-          <a:p>
-            <a:r>
-              <a:rPr lang="en-GB" dirty="0"/>
-              <a:t>There should (and usually is) a specific reason for adopting a strategy and should always be justified</a:t>
-            </a:r>
-          </a:p>
-          <a:p>
-            <a:r>
-              <a:rPr lang="en-GB" dirty="0"/>
-              <a:t>A topic to itself with plenty of differing opinions</a:t>
-            </a:r>
-          </a:p>
-          <a:p>
-            <a:r>
-              <a:rPr lang="en-GB" dirty="0"/>
-              <a:t>Undeniable truths </a:t>
+        <p:spPr/>
+        <p:txBody>
+          <a:bodyPr>
+            <a:normAutofit/>
+          </a:bodyPr>
+          <a:lstStyle/>
+          <a:p>
+            <a:r>
+              <a:rPr lang="en-GB" dirty="0"/>
+              <a:t>Typical implementations</a:t>
             </a:r>
           </a:p>
           <a:p>
             <a:pPr lvl="1"/>
             <a:r>
               <a:rPr lang="en-GB" dirty="0"/>
-              <a:t>They introduce complexity </a:t>
+              <a:t>Lock based -You lock a file while you are working on it</a:t>
             </a:r>
           </a:p>
           <a:p>
             <a:pPr lvl="1"/>
             <a:r>
               <a:rPr lang="en-GB" dirty="0"/>
-              <a:t>The longer they exist and diverge, the harder the merge</a:t>
-            </a:r>
-          </a:p>
-          <a:p>
-            <a:pPr lvl="1"/>
-            <a:r>
-              <a:rPr lang="en-GB" dirty="0"/>
-              <a:t>(fondly referred to as merge parties)</a:t>
-            </a:r>
-          </a:p>
-          <a:p>
-            <a:pPr lvl="1"/>
+              <a:t>Deltas – stores files in a space efficient manner by only storing the parts that have changed using a method called </a:t>
+            </a:r>
+            <a:r>
+              <a:rPr lang="en-GB" b="1" dirty="0"/>
+              <a:t>Interleaved deltas</a:t>
+            </a:r>
+            <a:r>
+              <a:rPr lang="en-GB" dirty="0"/>
+              <a:t> </a:t>
+            </a:r>
+          </a:p>
+          <a:p>
             <a:endParaRPr lang="en-GB" dirty="0"/>
           </a:p>
           <a:p>
-            <a:pPr lvl="1"/>
             <a:endParaRPr lang="en-GB" dirty="0"/>
           </a:p>
         </p:txBody>
       </p:sp>
-      <p:pic>
-        <p:nvPicPr>
-          <p:cNvPr id="4" name="Picture 3">
-            <a:extLst>
-              <a:ext uri="{FF2B5EF4-FFF2-40B4-BE49-F238E27FC236}">
-                <a16:creationId xmlns:a16="http://schemas.microsoft.com/office/drawing/2014/main" id="{CA97A125-94DE-4A7A-8DF0-FDCBEE0FA319}"/>
-              </a:ext>
-            </a:extLst>
-          </p:cNvPr>
-          <p:cNvPicPr>
-            <a:picLocks noChangeAspect="1"/>
-          </p:cNvPicPr>
-          <p:nvPr/>
-        </p:nvPicPr>
-        <p:blipFill>
-          <a:blip r:embed="rId2"/>
-          <a:stretch>
-            <a:fillRect/>
-          </a:stretch>
-        </p:blipFill>
-        <p:spPr>
-          <a:xfrm>
-            <a:off x="3803858" y="258650"/>
-            <a:ext cx="2672357" cy="1225317"/>
-          </a:xfrm>
-          <a:prstGeom prst="rect">
-            <a:avLst/>
-          </a:prstGeom>
-        </p:spPr>
-      </p:pic>
-      <p:pic>
-        <p:nvPicPr>
-          <p:cNvPr id="5" name="Picture 4">
-            <a:extLst>
-              <a:ext uri="{FF2B5EF4-FFF2-40B4-BE49-F238E27FC236}">
-                <a16:creationId xmlns:a16="http://schemas.microsoft.com/office/drawing/2014/main" id="{685E1424-ACBD-4771-890F-14A87FAB4A86}"/>
-              </a:ext>
-            </a:extLst>
-          </p:cNvPr>
-          <p:cNvPicPr>
-            <a:picLocks noChangeAspect="1"/>
-          </p:cNvPicPr>
-          <p:nvPr/>
-        </p:nvPicPr>
-        <p:blipFill>
-          <a:blip r:embed="rId3"/>
-          <a:stretch>
-            <a:fillRect/>
-          </a:stretch>
-        </p:blipFill>
-        <p:spPr>
-          <a:xfrm>
-            <a:off x="8181138" y="591296"/>
-            <a:ext cx="3324225" cy="1323975"/>
-          </a:xfrm>
-          <a:prstGeom prst="rect">
-            <a:avLst/>
-          </a:prstGeom>
-        </p:spPr>
-      </p:pic>
-      <p:pic>
-        <p:nvPicPr>
-          <p:cNvPr id="6" name="Picture 5">
-            <a:extLst>
-              <a:ext uri="{FF2B5EF4-FFF2-40B4-BE49-F238E27FC236}">
-                <a16:creationId xmlns:a16="http://schemas.microsoft.com/office/drawing/2014/main" id="{27CE5729-6718-44E5-85D7-70E90D597B05}"/>
-              </a:ext>
-            </a:extLst>
-          </p:cNvPr>
-          <p:cNvPicPr>
-            <a:picLocks noChangeAspect="1"/>
-          </p:cNvPicPr>
-          <p:nvPr/>
-        </p:nvPicPr>
-        <p:blipFill>
-          <a:blip r:embed="rId4"/>
-          <a:stretch>
-            <a:fillRect/>
-          </a:stretch>
-        </p:blipFill>
-        <p:spPr>
-          <a:xfrm>
-            <a:off x="9648221" y="5011357"/>
-            <a:ext cx="2173788" cy="1544972"/>
-          </a:xfrm>
-          <a:prstGeom prst="rect">
-            <a:avLst/>
-          </a:prstGeom>
-        </p:spPr>
-      </p:pic>
-      <p:pic>
-        <p:nvPicPr>
-          <p:cNvPr id="7" name="Picture 6">
-            <a:extLst>
-              <a:ext uri="{FF2B5EF4-FFF2-40B4-BE49-F238E27FC236}">
-                <a16:creationId xmlns:a16="http://schemas.microsoft.com/office/drawing/2014/main" id="{D2C7F0FD-5DB9-4306-84A7-0ACDD207B37A}"/>
-              </a:ext>
-            </a:extLst>
-          </p:cNvPr>
-          <p:cNvPicPr>
-            <a:picLocks noChangeAspect="1"/>
-          </p:cNvPicPr>
-          <p:nvPr/>
-        </p:nvPicPr>
-        <p:blipFill>
-          <a:blip r:embed="rId5"/>
-          <a:stretch>
-            <a:fillRect/>
-          </a:stretch>
-        </p:blipFill>
-        <p:spPr>
-          <a:xfrm>
-            <a:off x="9205937" y="3310871"/>
-            <a:ext cx="2821206" cy="1489345"/>
-          </a:xfrm>
-          <a:prstGeom prst="rect">
-            <a:avLst/>
-          </a:prstGeom>
-        </p:spPr>
-      </p:pic>
     </p:spTree>
     <p:extLst>
       <p:ext uri="{BB962C8B-B14F-4D97-AF65-F5344CB8AC3E}">
-        <p14:creationId xmlns:p14="http://schemas.microsoft.com/office/powerpoint/2010/main" val="2069769236"/>
+        <p14:creationId xmlns:p14="http://schemas.microsoft.com/office/powerpoint/2010/main" val="4152929387"/>
       </p:ext>
     </p:extLst>
   </p:cSld>
@@ -9994,7 +10365,7 @@
           <p:cNvPr id="2" name="Title 1">
             <a:extLst>
               <a:ext uri="{FF2B5EF4-FFF2-40B4-BE49-F238E27FC236}">
-                <a16:creationId xmlns:a16="http://schemas.microsoft.com/office/drawing/2014/main" id="{74832897-E955-4172-BEA9-8F1B86779F48}"/>
+                <a16:creationId xmlns:a16="http://schemas.microsoft.com/office/drawing/2014/main" id="{D61586A8-0824-49D1-B516-1BD9CF6673A1}"/>
               </a:ext>
             </a:extLst>
           </p:cNvPr>
@@ -10012,7 +10383,7 @@
           <a:p>
             <a:r>
               <a:rPr lang="en-GB" dirty="0"/>
-              <a:t>Source Control Today – Rise of the DVCS</a:t>
+              <a:t>The next generation (86)</a:t>
             </a:r>
           </a:p>
         </p:txBody>
@@ -10022,7 +10393,7 @@
           <p:cNvPr id="3" name="Content Placeholder 2">
             <a:extLst>
               <a:ext uri="{FF2B5EF4-FFF2-40B4-BE49-F238E27FC236}">
-                <a16:creationId xmlns:a16="http://schemas.microsoft.com/office/drawing/2014/main" id="{DB8E8E41-8EC7-4475-A390-E2DC23C5E2C4}"/>
+                <a16:creationId xmlns:a16="http://schemas.microsoft.com/office/drawing/2014/main" id="{5615D9EE-CD05-4BF1-A655-66971E41C0FB}"/>
               </a:ext>
             </a:extLst>
           </p:cNvPr>
@@ -10041,63 +10412,136 @@
           <a:lstStyle/>
           <a:p>
             <a:r>
-              <a:rPr lang="en-GB" dirty="0"/>
-              <a:t>Distributed means no “real” central repository</a:t>
+              <a:rPr lang="en-GB" b="1" dirty="0"/>
+              <a:t>2nd Gen - CVS – Concurrent Versions System (1986),</a:t>
+            </a:r>
+          </a:p>
+          <a:p>
+            <a:r>
+              <a:rPr lang="en-GB" dirty="0"/>
+              <a:t>A client–server architecture</a:t>
             </a:r>
           </a:p>
           <a:p>
             <a:pPr lvl="1"/>
             <a:r>
               <a:rPr lang="en-GB" dirty="0"/>
-              <a:t>Although, there is usually a repository that is treated like the main central repository</a:t>
-            </a:r>
-          </a:p>
-          <a:p>
-            <a:r>
-              <a:rPr lang="en-GB" dirty="0"/>
-              <a:t>GIT</a:t>
+              <a:t>a server stores the current version(s) of a project and its history</a:t>
             </a:r>
           </a:p>
           <a:p>
             <a:pPr lvl="1"/>
             <a:r>
               <a:rPr lang="en-GB" dirty="0"/>
-              <a:t>Linus’s replacement for </a:t>
-            </a:r>
-            <a:r>
-              <a:rPr lang="en-GB" dirty="0" err="1"/>
-              <a:t>BitKeeper</a:t>
-            </a:r>
+              <a:t>clients connect to the server in order to "check out" a complete copy of the project, </a:t>
+            </a:r>
+          </a:p>
+          <a:p>
+            <a:pPr lvl="1"/>
+            <a:r>
+              <a:rPr lang="en-GB" dirty="0"/>
+              <a:t>clients work on this copy and then later "check in" their changes.</a:t>
+            </a:r>
+          </a:p>
+          <a:p>
+            <a:pPr lvl="1"/>
+            <a:r>
+              <a:rPr lang="en-GB" dirty="0"/>
+              <a:t>developers may work concurrently, each having their own "working copy" of the project</a:t>
+            </a:r>
+          </a:p>
+          <a:p>
+            <a:pPr lvl="1"/>
+            <a:r>
+              <a:rPr lang="en-GB" dirty="0"/>
+              <a:t>To avoid conflicts, the server only accepts changes made to the most recent version of a file. Developers keep their working copy up-to-date by incorporating other people's changes on a regular basis. </a:t>
+            </a:r>
+          </a:p>
+          <a:p>
+            <a:pPr lvl="1"/>
             <a:endParaRPr lang="en-GB" dirty="0"/>
           </a:p>
           <a:p>
-            <a:r>
-              <a:rPr lang="en-GB" dirty="0"/>
-              <a:t>Mercurial</a:t>
-            </a:r>
-          </a:p>
-          <a:p>
-            <a:pPr lvl="1"/>
-            <a:r>
-              <a:rPr lang="en-GB" dirty="0"/>
-              <a:t>Say what? – this is GIT’s evil twin</a:t>
-            </a:r>
-          </a:p>
-          <a:p>
-            <a:pPr marL="0" indent="0">
-              <a:buNone/>
-            </a:pPr>
-            <a:r>
-              <a:rPr lang="en-GB" dirty="0"/>
-              <a:t>	</a:t>
-            </a:r>
-          </a:p>
-        </p:txBody>
-      </p:sp>
+            <a:endParaRPr lang="en-GB" b="1" dirty="0"/>
+          </a:p>
+          <a:p>
+            <a:endParaRPr lang="en-GB" b="1" dirty="0"/>
+          </a:p>
+          <a:p>
+            <a:endParaRPr lang="en-GB" b="1" dirty="0"/>
+          </a:p>
+          <a:p>
+            <a:endParaRPr lang="en-GB" b="1" dirty="0"/>
+          </a:p>
+          <a:p>
+            <a:endParaRPr lang="en-GB" dirty="0"/>
+          </a:p>
+        </p:txBody>
+      </p:sp>
+      <p:pic>
+        <p:nvPicPr>
+          <p:cNvPr id="4" name="Picture 3">
+            <a:extLst>
+              <a:ext uri="{FF2B5EF4-FFF2-40B4-BE49-F238E27FC236}">
+                <a16:creationId xmlns:a16="http://schemas.microsoft.com/office/drawing/2014/main" id="{0863EB2B-3CC1-4DFD-8AFF-F3EAB8C22E55}"/>
+              </a:ext>
+            </a:extLst>
+          </p:cNvPr>
+          <p:cNvPicPr>
+            <a:picLocks noChangeAspect="1"/>
+          </p:cNvPicPr>
+          <p:nvPr/>
+        </p:nvPicPr>
+        <p:blipFill>
+          <a:blip r:embed="rId2"/>
+          <a:stretch>
+            <a:fillRect/>
+          </a:stretch>
+        </p:blipFill>
+        <p:spPr>
+          <a:xfrm>
+            <a:off x="6700051" y="648350"/>
+            <a:ext cx="1253251" cy="739871"/>
+          </a:xfrm>
+          <a:prstGeom prst="rect">
+            <a:avLst/>
+          </a:prstGeom>
+        </p:spPr>
+      </p:pic>
+      <p:pic>
+        <p:nvPicPr>
+          <p:cNvPr id="5" name="Picture 4">
+            <a:extLst>
+              <a:ext uri="{FF2B5EF4-FFF2-40B4-BE49-F238E27FC236}">
+                <a16:creationId xmlns:a16="http://schemas.microsoft.com/office/drawing/2014/main" id="{EF6E290A-A2A7-49E2-A9A8-B137DE2A7DA8}"/>
+              </a:ext>
+            </a:extLst>
+          </p:cNvPr>
+          <p:cNvPicPr>
+            <a:picLocks noChangeAspect="1"/>
+          </p:cNvPicPr>
+          <p:nvPr/>
+        </p:nvPicPr>
+        <p:blipFill>
+          <a:blip r:embed="rId3"/>
+          <a:stretch>
+            <a:fillRect/>
+          </a:stretch>
+        </p:blipFill>
+        <p:spPr>
+          <a:xfrm>
+            <a:off x="10191750" y="5586413"/>
+            <a:ext cx="1545189" cy="914400"/>
+          </a:xfrm>
+          <a:prstGeom prst="rect">
+            <a:avLst/>
+          </a:prstGeom>
+        </p:spPr>
+      </p:pic>
     </p:spTree>
     <p:extLst>
       <p:ext uri="{BB962C8B-B14F-4D97-AF65-F5344CB8AC3E}">
-        <p14:creationId xmlns:p14="http://schemas.microsoft.com/office/powerpoint/2010/main" val="320971741"/>
+        <p14:creationId xmlns:p14="http://schemas.microsoft.com/office/powerpoint/2010/main" val="2824413385"/>
       </p:ext>
     </p:extLst>
   </p:cSld>

</xml_diff>

<commit_message>
saved presentation just incase previous save didn't work
</commit_message>
<xml_diff>
--- a/SourceControlPresentation.pptx
+++ b/SourceControlPresentation.pptx
@@ -15483,13 +15483,8 @@
           <a:p>
             <a:r>
               <a:rPr lang="en-GB" dirty="0"/>
-              <a:t>Try this using feature branches, or not, up </a:t>
-            </a:r>
-            <a:r>
-              <a:rPr lang="en-GB"/>
-              <a:t>to you!</a:t>
-            </a:r>
-            <a:endParaRPr lang="en-GB" dirty="0"/>
+              <a:t>Try this using feature branches, or not, up to you!</a:t>
+            </a:r>
           </a:p>
         </p:txBody>
       </p:sp>

</xml_diff>